<commit_message>
14, 16 pptx done
</commit_message>
<xml_diff>
--- a/DEVSQL_14_ErrorHandling/DEVSQL_14_ErrorHandling.pptx
+++ b/DEVSQL_14_ErrorHandling/DEVSQL_14_ErrorHandling.pptx
@@ -5,22 +5,21 @@
     <p:sldMasterId id="2147483903" r:id="rId1"/>
   </p:sldMasterIdLst>
   <p:notesMasterIdLst>
-    <p:notesMasterId r:id="rId15"/>
+    <p:notesMasterId r:id="rId14"/>
   </p:notesMasterIdLst>
   <p:sldIdLst>
     <p:sldId id="256" r:id="rId2"/>
-    <p:sldId id="301" r:id="rId3"/>
-    <p:sldId id="302" r:id="rId4"/>
-    <p:sldId id="318" r:id="rId5"/>
-    <p:sldId id="315" r:id="rId6"/>
-    <p:sldId id="317" r:id="rId7"/>
-    <p:sldId id="316" r:id="rId8"/>
-    <p:sldId id="319" r:id="rId9"/>
-    <p:sldId id="322" r:id="rId10"/>
-    <p:sldId id="323" r:id="rId11"/>
-    <p:sldId id="320" r:id="rId12"/>
-    <p:sldId id="325" r:id="rId13"/>
-    <p:sldId id="321" r:id="rId14"/>
+    <p:sldId id="302" r:id="rId3"/>
+    <p:sldId id="318" r:id="rId4"/>
+    <p:sldId id="315" r:id="rId5"/>
+    <p:sldId id="317" r:id="rId6"/>
+    <p:sldId id="316" r:id="rId7"/>
+    <p:sldId id="319" r:id="rId8"/>
+    <p:sldId id="322" r:id="rId9"/>
+    <p:sldId id="323" r:id="rId10"/>
+    <p:sldId id="320" r:id="rId11"/>
+    <p:sldId id="325" r:id="rId12"/>
+    <p:sldId id="321" r:id="rId13"/>
   </p:sldIdLst>
   <p:sldSz cx="12192000" cy="6858000"/>
   <p:notesSz cx="6858000" cy="9144000"/>
@@ -232,7 +231,7 @@
           <a:p>
             <a:fld id="{A72FB546-F199-4B4F-99BF-57E72CB8BE0D}" type="datetimeFigureOut">
               <a:rPr lang="en-GB" smtClean="0"/>
-              <a:t>05/10/2018</a:t>
+              <a:t>30/10/2018</a:t>
             </a:fld>
             <a:endParaRPr lang="en-GB"/>
           </a:p>
@@ -808,7 +807,7 @@
           <a:p>
             <a:fld id="{5C5CE2A2-3206-4E3A-9A99-FAABE4DAA125}" type="datetime1">
               <a:rPr lang="en-US" smtClean="0"/>
-              <a:t>10/5/2018</a:t>
+              <a:t>10/30/2018</a:t>
             </a:fld>
             <a:endParaRPr lang="en-US" dirty="0"/>
           </a:p>
@@ -983,7 +982,7 @@
           <a:p>
             <a:fld id="{0F1C17CF-A957-4E8A-A201-064B17B676E6}" type="datetime1">
               <a:rPr lang="en-US" smtClean="0"/>
-              <a:t>10/5/2018</a:t>
+              <a:t>10/30/2018</a:t>
             </a:fld>
             <a:endParaRPr lang="en-US" dirty="0"/>
           </a:p>
@@ -1167,7 +1166,7 @@
           <a:p>
             <a:fld id="{3D3CF5F2-56F8-4BAA-9014-256A78D9899D}" type="datetime1">
               <a:rPr lang="en-US" smtClean="0"/>
-              <a:t>10/5/2018</a:t>
+              <a:t>10/30/2018</a:t>
             </a:fld>
             <a:endParaRPr lang="en-US" dirty="0"/>
           </a:p>
@@ -1341,7 +1340,7 @@
           <a:p>
             <a:fld id="{26A9926B-2EE6-46C1-BAAF-CFADEA78CEF2}" type="datetime1">
               <a:rPr lang="en-US" smtClean="0"/>
-              <a:t>10/5/2018</a:t>
+              <a:t>10/30/2018</a:t>
             </a:fld>
             <a:endParaRPr lang="en-US" dirty="0"/>
           </a:p>
@@ -1603,7 +1602,7 @@
           <a:p>
             <a:fld id="{882BD900-593C-4CF1-AE0B-E7C3733EDE40}" type="datetime1">
               <a:rPr lang="en-US" smtClean="0"/>
-              <a:t>10/5/2018</a:t>
+              <a:t>10/30/2018</a:t>
             </a:fld>
             <a:endParaRPr lang="en-US" dirty="0"/>
           </a:p>
@@ -1896,7 +1895,7 @@
           <a:p>
             <a:fld id="{40E78087-9CFA-45DE-97A1-07D94041B62B}" type="datetime1">
               <a:rPr lang="en-US" smtClean="0"/>
-              <a:t>10/5/2018</a:t>
+              <a:t>10/30/2018</a:t>
             </a:fld>
             <a:endParaRPr lang="en-US" dirty="0"/>
           </a:p>
@@ -2342,7 +2341,7 @@
           <a:p>
             <a:fld id="{038356C9-2EE6-4A18-B1E4-2F425D0F65AC}" type="datetime1">
               <a:rPr lang="en-US" smtClean="0"/>
-              <a:t>10/5/2018</a:t>
+              <a:t>10/30/2018</a:t>
             </a:fld>
             <a:endParaRPr lang="en-US" dirty="0"/>
           </a:p>
@@ -2464,7 +2463,7 @@
           <a:p>
             <a:fld id="{E89FB595-BC91-4D46-AF2F-F298D0F84364}" type="datetime1">
               <a:rPr lang="en-US" smtClean="0"/>
-              <a:t>10/5/2018</a:t>
+              <a:t>10/30/2018</a:t>
             </a:fld>
             <a:endParaRPr lang="en-US" dirty="0"/>
           </a:p>
@@ -2563,7 +2562,7 @@
           <a:p>
             <a:fld id="{4A8739EC-2521-489F-BE22-017CA71179C4}" type="datetime1">
               <a:rPr lang="en-US" smtClean="0"/>
-              <a:t>10/5/2018</a:t>
+              <a:t>10/30/2018</a:t>
             </a:fld>
             <a:endParaRPr lang="en-US" dirty="0"/>
           </a:p>
@@ -2855,7 +2854,7 @@
           <a:p>
             <a:fld id="{DC3BAB20-D992-412E-A727-784641F62562}" type="datetime1">
               <a:rPr lang="en-US" smtClean="0"/>
-              <a:t>10/5/2018</a:t>
+              <a:t>10/30/2018</a:t>
             </a:fld>
             <a:endParaRPr lang="en-US" dirty="0"/>
           </a:p>
@@ -3133,7 +3132,7 @@
           <a:p>
             <a:fld id="{0B6D6925-5610-42E8-B3A7-2C5D3F66E2EB}" type="datetime1">
               <a:rPr lang="en-US" smtClean="0"/>
-              <a:t>10/5/2018</a:t>
+              <a:t>10/30/2018</a:t>
             </a:fld>
             <a:endParaRPr lang="en-US" dirty="0"/>
           </a:p>
@@ -3435,7 +3434,7 @@
           <a:p>
             <a:fld id="{A6C63E1A-1DEA-4C6C-9EF8-1BE1B485BBB4}" type="datetime1">
               <a:rPr lang="en-US" smtClean="0"/>
-              <a:t>10/5/2018</a:t>
+              <a:t>10/30/2018</a:t>
             </a:fld>
             <a:endParaRPr lang="en-US" dirty="0"/>
           </a:p>
@@ -4016,7 +4015,7 @@
         <p:spPr>
           <a:xfrm>
             <a:off x="489706" y="624631"/>
-            <a:ext cx="10374037" cy="523220"/>
+            <a:ext cx="5169689" cy="1631216"/>
           </a:xfrm>
           <a:prstGeom prst="rect">
             <a:avLst/>
@@ -4031,9 +4030,19 @@
           <a:p>
             <a:r>
               <a:rPr lang="pl-PL" sz="2800" b="1" dirty="0"/>
-              <a:t>XACT_ABORT</a:t>
+              <a:t>TRY - CATCH</a:t>
             </a:r>
             <a:endParaRPr lang="en-US" sz="2800" b="1" dirty="0"/>
+          </a:p>
+          <a:p>
+            <a:endParaRPr lang="en-US" dirty="0"/>
+          </a:p>
+          <a:p>
+            <a:r>
+              <a:rPr lang="en-US" dirty="0"/>
+              <a:t>A TRY…CATCH construct catches all execution errors that have a severity higher than 10 that do not close the database connection.</a:t>
+            </a:r>
+            <a:endParaRPr lang="pl-PL" dirty="0"/>
           </a:p>
         </p:txBody>
       </p:sp>
@@ -4067,10 +4076,10 @@
       </p:sp>
       <p:pic>
         <p:nvPicPr>
-          <p:cNvPr id="2" name="Obraz 1">
+          <p:cNvPr id="3" name="Obraz 2">
             <a:extLst>
               <a:ext uri="{FF2B5EF4-FFF2-40B4-BE49-F238E27FC236}">
-                <a16:creationId xmlns:a16="http://schemas.microsoft.com/office/drawing/2014/main" xmlns="" id="{31DCFDEB-5A40-4D10-9CB0-E3C43AAF3645}"/>
+                <a16:creationId xmlns="" xmlns:a16="http://schemas.microsoft.com/office/drawing/2014/main" id="{FDF2F0F0-1527-4321-BDC1-548852E992A4}"/>
               </a:ext>
             </a:extLst>
           </p:cNvPr>
@@ -4087,48 +4096,28 @@
         </p:blipFill>
         <p:spPr>
           <a:xfrm>
-            <a:off x="1287728" y="1504200"/>
-            <a:ext cx="3895725" cy="4324350"/>
+            <a:off x="6343135" y="1160592"/>
+            <a:ext cx="4520608" cy="4590156"/>
           </a:xfrm>
           <a:prstGeom prst="rect">
             <a:avLst/>
           </a:prstGeom>
-        </p:spPr>
-      </p:pic>
-      <p:pic>
-        <p:nvPicPr>
-          <p:cNvPr id="3" name="Obraz 2">
-            <a:extLst>
-              <a:ext uri="{FF2B5EF4-FFF2-40B4-BE49-F238E27FC236}">
-                <a16:creationId xmlns:a16="http://schemas.microsoft.com/office/drawing/2014/main" xmlns="" id="{1029454C-42D7-48AC-82F7-3AED4F8162CF}"/>
-              </a:ext>
-            </a:extLst>
-          </p:cNvPr>
-          <p:cNvPicPr>
-            <a:picLocks noChangeAspect="1"/>
-          </p:cNvPicPr>
-          <p:nvPr/>
-        </p:nvPicPr>
-        <p:blipFill>
-          <a:blip r:embed="rId3"/>
-          <a:stretch>
-            <a:fillRect/>
-          </a:stretch>
-        </p:blipFill>
-        <p:spPr>
-          <a:xfrm>
-            <a:off x="6557435" y="1504200"/>
-            <a:ext cx="4076700" cy="4495800"/>
-          </a:xfrm>
-          <a:prstGeom prst="rect">
-            <a:avLst/>
-          </a:prstGeom>
+          <a:ln>
+            <a:noFill/>
+          </a:ln>
+          <a:effectLst>
+            <a:outerShdw blurRad="292100" dist="139700" dir="2700000" algn="tl" rotWithShape="0">
+              <a:srgbClr val="333333">
+                <a:alpha val="65000"/>
+              </a:srgbClr>
+            </a:outerShdw>
+          </a:effectLst>
         </p:spPr>
       </p:pic>
     </p:spTree>
     <p:extLst>
       <p:ext uri="{BB962C8B-B14F-4D97-AF65-F5344CB8AC3E}">
-        <p14:creationId xmlns:p14="http://schemas.microsoft.com/office/powerpoint/2010/main" val="2821951142"/>
+        <p14:creationId xmlns:p14="http://schemas.microsoft.com/office/powerpoint/2010/main" val="795604991"/>
       </p:ext>
     </p:extLst>
   </p:cSld>
@@ -4164,7 +4153,7 @@
         <p:spPr>
           <a:xfrm>
             <a:off x="489706" y="624631"/>
-            <a:ext cx="10374037" cy="1354217"/>
+            <a:ext cx="10374037" cy="4678204"/>
           </a:xfrm>
           <a:prstGeom prst="rect">
             <a:avLst/>
@@ -4187,11 +4176,79 @@
             <a:endParaRPr lang="en-US" dirty="0"/>
           </a:p>
           <a:p>
+            <a:pPr lvl="1"/>
             <a:r>
               <a:rPr lang="en-US" dirty="0"/>
-              <a:t>A TRY…CATCH construct catches all execution errors that have a severity higher than 10 that do not close the database connection.</a:t>
+              <a:t>A TRY block </a:t>
+            </a:r>
+            <a:r>
+              <a:rPr lang="en-US" b="1" dirty="0"/>
+              <a:t>must be immediately followed by an associated CATCH block</a:t>
+            </a:r>
+            <a:r>
+              <a:rPr lang="en-US" dirty="0"/>
+              <a:t>. Including any other statements between the END TRY and BEGIN CATCH statements generates a syntax error.</a:t>
             </a:r>
             <a:endParaRPr lang="pl-PL" dirty="0"/>
+          </a:p>
+          <a:p>
+            <a:pPr lvl="1"/>
+            <a:endParaRPr lang="en-US" dirty="0"/>
+          </a:p>
+          <a:p>
+            <a:pPr lvl="1"/>
+            <a:r>
+              <a:rPr lang="en-US" dirty="0"/>
+              <a:t>A TRY…CATCH construct </a:t>
+            </a:r>
+            <a:r>
+              <a:rPr lang="en-US" b="1" dirty="0"/>
+              <a:t>cannot span multiple batches</a:t>
+            </a:r>
+            <a:r>
+              <a:rPr lang="en-US" dirty="0"/>
+              <a:t>. A TRY…CATCH construct cannot span multiple blocks of Transact-SQL statements. For example, a TRY…CATCH construct </a:t>
+            </a:r>
+            <a:r>
+              <a:rPr lang="en-US" b="1" dirty="0"/>
+              <a:t>cannot span two BEGIN…END blocks </a:t>
+            </a:r>
+            <a:r>
+              <a:rPr lang="en-US" dirty="0"/>
+              <a:t>of Transact-SQL statements and </a:t>
+            </a:r>
+            <a:r>
+              <a:rPr lang="en-US" b="1" dirty="0"/>
+              <a:t>cannot span an IF…ELSE construct</a:t>
+            </a:r>
+            <a:r>
+              <a:rPr lang="en-US" dirty="0"/>
+              <a:t>.</a:t>
+            </a:r>
+            <a:endParaRPr lang="pl-PL" dirty="0"/>
+          </a:p>
+          <a:p>
+            <a:pPr lvl="1"/>
+            <a:endParaRPr lang="en-US" dirty="0"/>
+          </a:p>
+          <a:p>
+            <a:pPr lvl="1"/>
+            <a:r>
+              <a:rPr lang="en-US" dirty="0"/>
+              <a:t>If there are no errors in the code that is enclosed in a TRY block, when the last statement in the TRY block has finished running, control passes to the statement immediately after the associated END CATCH statement. </a:t>
+            </a:r>
+            <a:endParaRPr lang="pl-PL" dirty="0"/>
+          </a:p>
+          <a:p>
+            <a:pPr lvl="1"/>
+            <a:endParaRPr lang="pl-PL" dirty="0"/>
+          </a:p>
+          <a:p>
+            <a:pPr lvl="1"/>
+            <a:r>
+              <a:rPr lang="en-US" dirty="0"/>
+              <a:t>If there is an error in the code that is enclosed in a TRY block, control passes to the first statement in the associated CATCH block. If the END CATCH statement is the last statement in a stored procedure or trigger, control is passed back to the statement that called the stored procedure or fired the trigger.</a:t>
+            </a:r>
           </a:p>
         </p:txBody>
       </p:sp>
@@ -4223,40 +4280,10 @@
           </a:p>
         </p:txBody>
       </p:sp>
-      <p:pic>
-        <p:nvPicPr>
-          <p:cNvPr id="3" name="Obraz 2">
-            <a:extLst>
-              <a:ext uri="{FF2B5EF4-FFF2-40B4-BE49-F238E27FC236}">
-                <a16:creationId xmlns:a16="http://schemas.microsoft.com/office/drawing/2014/main" xmlns="" id="{FDF2F0F0-1527-4321-BDC1-548852E992A4}"/>
-              </a:ext>
-            </a:extLst>
-          </p:cNvPr>
-          <p:cNvPicPr>
-            <a:picLocks noChangeAspect="1"/>
-          </p:cNvPicPr>
-          <p:nvPr/>
-        </p:nvPicPr>
-        <p:blipFill>
-          <a:blip r:embed="rId2"/>
-          <a:stretch>
-            <a:fillRect/>
-          </a:stretch>
-        </p:blipFill>
-        <p:spPr>
-          <a:xfrm>
-            <a:off x="7148993" y="1978848"/>
-            <a:ext cx="3714750" cy="3771900"/>
-          </a:xfrm>
-          <a:prstGeom prst="rect">
-            <a:avLst/>
-          </a:prstGeom>
-        </p:spPr>
-      </p:pic>
     </p:spTree>
     <p:extLst>
       <p:ext uri="{BB962C8B-B14F-4D97-AF65-F5344CB8AC3E}">
-        <p14:creationId xmlns:p14="http://schemas.microsoft.com/office/powerpoint/2010/main" val="795604991"/>
+        <p14:creationId xmlns:p14="http://schemas.microsoft.com/office/powerpoint/2010/main" val="2824461919"/>
       </p:ext>
     </p:extLst>
   </p:cSld>
@@ -4292,165 +4319,6 @@
         <p:spPr>
           <a:xfrm>
             <a:off x="489706" y="624631"/>
-            <a:ext cx="10374037" cy="4678204"/>
-          </a:xfrm>
-          <a:prstGeom prst="rect">
-            <a:avLst/>
-          </a:prstGeom>
-          <a:noFill/>
-        </p:spPr>
-        <p:txBody>
-          <a:bodyPr wrap="square" rtlCol="0">
-            <a:spAutoFit/>
-          </a:bodyPr>
-          <a:lstStyle/>
-          <a:p>
-            <a:r>
-              <a:rPr lang="pl-PL" sz="2800" b="1" dirty="0"/>
-              <a:t>TRY - CATCH</a:t>
-            </a:r>
-            <a:endParaRPr lang="en-US" sz="2800" b="1" dirty="0"/>
-          </a:p>
-          <a:p>
-            <a:endParaRPr lang="en-US" dirty="0"/>
-          </a:p>
-          <a:p>
-            <a:r>
-              <a:rPr lang="en-US" dirty="0"/>
-              <a:t>A TRY block </a:t>
-            </a:r>
-            <a:r>
-              <a:rPr lang="en-US" b="1" dirty="0"/>
-              <a:t>must be immediately followed by an associated CATCH block</a:t>
-            </a:r>
-            <a:r>
-              <a:rPr lang="en-US" dirty="0"/>
-              <a:t>. Including any other statements between the END TRY and BEGIN CATCH statements generates a syntax error.</a:t>
-            </a:r>
-            <a:endParaRPr lang="pl-PL" dirty="0"/>
-          </a:p>
-          <a:p>
-            <a:endParaRPr lang="en-US" dirty="0"/>
-          </a:p>
-          <a:p>
-            <a:r>
-              <a:rPr lang="en-US" dirty="0"/>
-              <a:t>A TRY…CATCH construct </a:t>
-            </a:r>
-            <a:r>
-              <a:rPr lang="en-US" b="1" dirty="0"/>
-              <a:t>cannot span multiple batches</a:t>
-            </a:r>
-            <a:r>
-              <a:rPr lang="en-US" dirty="0"/>
-              <a:t>. A TRY…CATCH construct cannot span multiple blocks of Transact-SQL statements. For example, a TRY…CATCH construct </a:t>
-            </a:r>
-            <a:r>
-              <a:rPr lang="en-US" b="1" dirty="0"/>
-              <a:t>cannot span two BEGIN…END blocks </a:t>
-            </a:r>
-            <a:r>
-              <a:rPr lang="en-US" dirty="0"/>
-              <a:t>of Transact-SQL statements and </a:t>
-            </a:r>
-            <a:r>
-              <a:rPr lang="en-US" b="1" dirty="0"/>
-              <a:t>cannot span an IF…ELSE construct</a:t>
-            </a:r>
-            <a:r>
-              <a:rPr lang="en-US" dirty="0"/>
-              <a:t>.</a:t>
-            </a:r>
-            <a:endParaRPr lang="pl-PL" dirty="0"/>
-          </a:p>
-          <a:p>
-            <a:endParaRPr lang="en-US" dirty="0"/>
-          </a:p>
-          <a:p>
-            <a:r>
-              <a:rPr lang="en-US" dirty="0"/>
-              <a:t>If there are no errors in the code that is enclosed in a TRY block, when the last statement in the TRY block has finished running, control passes to the statement immediately after the associated END CATCH statement. </a:t>
-            </a:r>
-            <a:endParaRPr lang="pl-PL" dirty="0"/>
-          </a:p>
-          <a:p>
-            <a:endParaRPr lang="pl-PL" dirty="0"/>
-          </a:p>
-          <a:p>
-            <a:r>
-              <a:rPr lang="en-US" dirty="0"/>
-              <a:t>If there is an error in the code that is enclosed in a TRY block, control passes to the first statement in the associated CATCH block. If the END CATCH statement is the last statement in a stored procedure or trigger, control is passed back to the statement that called the stored procedure or fired the trigger.</a:t>
-            </a:r>
-          </a:p>
-        </p:txBody>
-      </p:sp>
-      <p:sp>
-        <p:nvSpPr>
-          <p:cNvPr id="12" name="Symbol zastępczy stopki 11"/>
-          <p:cNvSpPr>
-            <a:spLocks noGrp="1"/>
-          </p:cNvSpPr>
-          <p:nvPr>
-            <p:ph type="ftr" sz="quarter" idx="11"/>
-          </p:nvPr>
-        </p:nvSpPr>
-        <p:spPr>
-          <a:xfrm>
-            <a:off x="3869268" y="6356350"/>
-            <a:ext cx="5911517" cy="365125"/>
-          </a:xfrm>
-        </p:spPr>
-        <p:txBody>
-          <a:bodyPr/>
-          <a:lstStyle/>
-          <a:p>
-            <a:r>
-              <a:rPr lang="en-US" smtClean="0"/>
-              <a:t>Developing SQL Databases</a:t>
-            </a:r>
-            <a:endParaRPr lang="pl-PL" dirty="0"/>
-          </a:p>
-        </p:txBody>
-      </p:sp>
-    </p:spTree>
-    <p:extLst>
-      <p:ext uri="{BB962C8B-B14F-4D97-AF65-F5344CB8AC3E}">
-        <p14:creationId xmlns:p14="http://schemas.microsoft.com/office/powerpoint/2010/main" val="2824461919"/>
-      </p:ext>
-    </p:extLst>
-  </p:cSld>
-  <p:clrMapOvr>
-    <a:masterClrMapping/>
-  </p:clrMapOvr>
-</p:sld>
-</file>
-
-<file path=ppt/slides/slide13.xml><?xml version="1.0" encoding="utf-8"?>
-<p:sld xmlns:a="http://schemas.openxmlformats.org/drawingml/2006/main" xmlns:r="http://schemas.openxmlformats.org/officeDocument/2006/relationships" xmlns:p="http://schemas.openxmlformats.org/presentationml/2006/main">
-  <p:cSld>
-    <p:spTree>
-      <p:nvGrpSpPr>
-        <p:cNvPr id="1" name=""/>
-        <p:cNvGrpSpPr/>
-        <p:nvPr/>
-      </p:nvGrpSpPr>
-      <p:grpSpPr>
-        <a:xfrm>
-          <a:off x="0" y="0"/>
-          <a:ext cx="0" cy="0"/>
-          <a:chOff x="0" y="0"/>
-          <a:chExt cx="0" cy="0"/>
-        </a:xfrm>
-      </p:grpSpPr>
-      <p:sp>
-        <p:nvSpPr>
-          <p:cNvPr id="9" name="pole tekstowe 8"/>
-          <p:cNvSpPr txBox="1"/>
-          <p:nvPr/>
-        </p:nvSpPr>
-        <p:spPr>
-          <a:xfrm>
-            <a:off x="489706" y="624631"/>
             <a:ext cx="10374037" cy="4955203"/>
           </a:xfrm>
           <a:prstGeom prst="rect">
@@ -4474,7 +4342,7 @@
             <a:endParaRPr lang="en-US" dirty="0"/>
           </a:p>
           <a:p>
-            <a:pPr marL="285750" indent="-285750">
+            <a:pPr marL="742950" lvl="1" indent="-285750">
               <a:buFont typeface="Arial" panose="020B0604020202020204" pitchFamily="34" charset="0"/>
               <a:buChar char="•"/>
             </a:pPr>
@@ -4492,7 +4360,7 @@
             </a:r>
           </a:p>
           <a:p>
-            <a:pPr marL="285750" indent="-285750">
+            <a:pPr marL="742950" lvl="1" indent="-285750">
               <a:buFont typeface="Arial" panose="020B0604020202020204" pitchFamily="34" charset="0"/>
               <a:buChar char="•"/>
             </a:pPr>
@@ -4510,7 +4378,7 @@
             </a:r>
           </a:p>
           <a:p>
-            <a:pPr marL="285750" indent="-285750">
+            <a:pPr marL="742950" lvl="1" indent="-285750">
               <a:buFont typeface="Arial" panose="020B0604020202020204" pitchFamily="34" charset="0"/>
               <a:buChar char="•"/>
             </a:pPr>
@@ -4532,7 +4400,7 @@
             </a:r>
           </a:p>
           <a:p>
-            <a:pPr marL="285750" indent="-285750">
+            <a:pPr marL="742950" lvl="1" indent="-285750">
               <a:buFont typeface="Arial" panose="020B0604020202020204" pitchFamily="34" charset="0"/>
               <a:buChar char="•"/>
             </a:pPr>
@@ -4542,7 +4410,7 @@
             </a:r>
           </a:p>
           <a:p>
-            <a:pPr marL="285750" indent="-285750">
+            <a:pPr marL="742950" lvl="1" indent="-285750">
               <a:buFont typeface="Arial" panose="020B0604020202020204" pitchFamily="34" charset="0"/>
               <a:buChar char="•"/>
             </a:pPr>
@@ -4560,7 +4428,7 @@
             </a:r>
           </a:p>
           <a:p>
-            <a:pPr marL="285750" indent="-285750">
+            <a:pPr marL="742950" lvl="1" indent="-285750">
               <a:buFont typeface="Arial" panose="020B0604020202020204" pitchFamily="34" charset="0"/>
               <a:buChar char="•"/>
             </a:pPr>
@@ -4578,7 +4446,7 @@
             </a:r>
           </a:p>
           <a:p>
-            <a:pPr marL="285750" indent="-285750">
+            <a:pPr marL="742950" lvl="1" indent="-285750">
               <a:buFont typeface="Arial" panose="020B0604020202020204" pitchFamily="34" charset="0"/>
               <a:buChar char="•"/>
             </a:pPr>
@@ -4654,76 +4522,351 @@
       </p:grpSpPr>
       <p:sp>
         <p:nvSpPr>
-          <p:cNvPr id="2" name="Tytuł 1"/>
-          <p:cNvSpPr>
-            <a:spLocks noGrp="1"/>
-          </p:cNvSpPr>
-          <p:nvPr>
-            <p:ph type="title"/>
-          </p:nvPr>
-        </p:nvSpPr>
-        <p:spPr/>
+          <p:cNvPr id="9" name="pole tekstowe 8"/>
+          <p:cNvSpPr txBox="1"/>
+          <p:nvPr/>
+        </p:nvSpPr>
+        <p:spPr>
+          <a:xfrm>
+            <a:off x="489706" y="624631"/>
+            <a:ext cx="10374037" cy="5539978"/>
+          </a:xfrm>
+          <a:prstGeom prst="rect">
+            <a:avLst/>
+          </a:prstGeom>
+          <a:noFill/>
+        </p:spPr>
+        <p:txBody>
+          <a:bodyPr wrap="square" rtlCol="0">
+            <a:spAutoFit/>
+          </a:bodyPr>
+          <a:lstStyle/>
+          <a:p>
+            <a:r>
+              <a:rPr lang="pl-PL" sz="2800" b="1" dirty="0"/>
+              <a:t>ERROR MESSAGE</a:t>
+            </a:r>
+            <a:endParaRPr lang="en-US" sz="2800" b="1" dirty="0"/>
+          </a:p>
+          <a:p>
+            <a:endParaRPr lang="en-US" dirty="0"/>
+          </a:p>
+          <a:p>
+            <a:r>
+              <a:rPr lang="en-US" sz="1600" b="1" dirty="0"/>
+              <a:t>Error number </a:t>
+            </a:r>
+            <a:endParaRPr lang="pl-PL" sz="1600" b="1" dirty="0"/>
+          </a:p>
+          <a:p>
+            <a:pPr lvl="1"/>
+            <a:r>
+              <a:rPr lang="en-US" sz="1600" dirty="0" smtClean="0"/>
+              <a:t>The </a:t>
+            </a:r>
+            <a:r>
+              <a:rPr lang="en-US" sz="1600" dirty="0"/>
+              <a:t>error number is an integer value.</a:t>
+            </a:r>
+          </a:p>
+          <a:p>
+            <a:pPr marL="1200150" lvl="2" indent="-285750">
+              <a:buFont typeface="Arial" panose="020B0604020202020204" pitchFamily="34" charset="0"/>
+              <a:buChar char="•"/>
+            </a:pPr>
+            <a:r>
+              <a:rPr lang="en-US" sz="1400" i="1" dirty="0"/>
+              <a:t>SQL Server error messages are numbered from </a:t>
+            </a:r>
+            <a:r>
+              <a:rPr lang="en-US" sz="1400" b="1" i="1" dirty="0"/>
+              <a:t>1 through 49999</a:t>
+            </a:r>
+            <a:r>
+              <a:rPr lang="en-US" sz="1400" i="1" dirty="0"/>
+              <a:t>.</a:t>
+            </a:r>
+          </a:p>
+          <a:p>
+            <a:pPr marL="1200150" lvl="2" indent="-285750">
+              <a:buFont typeface="Arial" panose="020B0604020202020204" pitchFamily="34" charset="0"/>
+              <a:buChar char="•"/>
+            </a:pPr>
+            <a:r>
+              <a:rPr lang="en-US" sz="1400" i="1" dirty="0"/>
+              <a:t>Custom error messages are numbered </a:t>
+            </a:r>
+            <a:r>
+              <a:rPr lang="en-US" sz="1400" b="1" i="1" dirty="0"/>
+              <a:t>50001 and higher</a:t>
+            </a:r>
+            <a:r>
+              <a:rPr lang="en-US" sz="1400" i="1" dirty="0"/>
+              <a:t>.</a:t>
+            </a:r>
+          </a:p>
+          <a:p>
+            <a:pPr marL="1200150" lvl="2" indent="-285750">
+              <a:buFont typeface="Arial" panose="020B0604020202020204" pitchFamily="34" charset="0"/>
+              <a:buChar char="•"/>
+            </a:pPr>
+            <a:r>
+              <a:rPr lang="en-US" sz="1400" i="1" dirty="0"/>
+              <a:t>The error number </a:t>
+            </a:r>
+            <a:r>
+              <a:rPr lang="en-US" sz="1400" b="1" i="1" dirty="0"/>
+              <a:t>50000</a:t>
+            </a:r>
+            <a:r>
+              <a:rPr lang="en-US" sz="1400" i="1" dirty="0"/>
+              <a:t> is reserved for a custom message that does not have a</a:t>
+            </a:r>
+            <a:r>
+              <a:rPr lang="pl-PL" sz="1400" i="1" dirty="0"/>
+              <a:t> </a:t>
+            </a:r>
+            <a:r>
+              <a:rPr lang="en-US" sz="1400" i="1" dirty="0"/>
+              <a:t>custom error number</a:t>
+            </a:r>
+            <a:r>
+              <a:rPr lang="en-US" sz="1400" i="1" dirty="0" smtClean="0"/>
+              <a:t>.</a:t>
+            </a:r>
+            <a:endParaRPr lang="pl-PL" sz="1400" i="1" dirty="0" smtClean="0"/>
+          </a:p>
+          <a:p>
+            <a:pPr marL="285750" indent="-285750">
+              <a:buFont typeface="Arial" panose="020B0604020202020204" pitchFamily="34" charset="0"/>
+              <a:buChar char="•"/>
+            </a:pPr>
+            <a:endParaRPr lang="en-US" sz="1600" dirty="0"/>
+          </a:p>
+          <a:p>
+            <a:r>
+              <a:rPr lang="en-US" sz="1600" b="1" dirty="0"/>
+              <a:t>Severity level </a:t>
+            </a:r>
+            <a:endParaRPr lang="pl-PL" sz="1600" b="1" dirty="0"/>
+          </a:p>
+          <a:p>
+            <a:pPr lvl="1"/>
+            <a:r>
+              <a:rPr lang="en-US" sz="1600" dirty="0" smtClean="0"/>
+              <a:t>SQL </a:t>
+            </a:r>
+            <a:r>
+              <a:rPr lang="en-US" sz="1600" dirty="0"/>
+              <a:t>Server defines </a:t>
+            </a:r>
+            <a:r>
+              <a:rPr lang="en-US" sz="1600" b="1" dirty="0"/>
+              <a:t>26 severity levels </a:t>
+            </a:r>
+            <a:r>
+              <a:rPr lang="en-US" sz="1600" dirty="0"/>
+              <a:t>numbered from 0 through 25.</a:t>
+            </a:r>
+          </a:p>
+          <a:p>
+            <a:pPr marL="1200150" lvl="2" indent="-285750">
+              <a:buFont typeface="Arial" panose="020B0604020202020204" pitchFamily="34" charset="0"/>
+              <a:buChar char="•"/>
+            </a:pPr>
+            <a:r>
+              <a:rPr lang="en-US" sz="1400" i="1" dirty="0"/>
+              <a:t>As a general rule, errors with a severity level of 16 or higher are logged automatically</a:t>
+            </a:r>
+            <a:r>
+              <a:rPr lang="pl-PL" sz="1400" i="1" dirty="0"/>
+              <a:t> </a:t>
+            </a:r>
+            <a:r>
+              <a:rPr lang="en-US" sz="1400" i="1" dirty="0"/>
+              <a:t>to the SQL Server log and the Windows Application log.</a:t>
+            </a:r>
+          </a:p>
+          <a:p>
+            <a:pPr marL="1200150" lvl="2" indent="-285750">
+              <a:buFont typeface="Arial" panose="020B0604020202020204" pitchFamily="34" charset="0"/>
+              <a:buChar char="•"/>
+            </a:pPr>
+            <a:r>
+              <a:rPr lang="en-US" sz="1400" i="1" dirty="0"/>
+              <a:t>Errors with a severity level from 19 through 25 can be specified only by members of</a:t>
+            </a:r>
+            <a:r>
+              <a:rPr lang="pl-PL" sz="1400" i="1" dirty="0"/>
+              <a:t> </a:t>
+            </a:r>
+            <a:r>
+              <a:rPr lang="en-US" sz="1400" i="1" dirty="0"/>
+              <a:t>the sysadmin fixed server role.</a:t>
+            </a:r>
+          </a:p>
+          <a:p>
+            <a:pPr marL="1200150" lvl="2" indent="-285750">
+              <a:buFont typeface="Arial" panose="020B0604020202020204" pitchFamily="34" charset="0"/>
+              <a:buChar char="•"/>
+            </a:pPr>
+            <a:r>
+              <a:rPr lang="en-US" sz="1400" i="1" dirty="0"/>
+              <a:t>Errors with a severity level from 20 through 25 are considered </a:t>
+            </a:r>
+            <a:r>
+              <a:rPr lang="en-US" sz="1400" b="1" i="1" dirty="0"/>
+              <a:t>fatal</a:t>
+            </a:r>
+            <a:r>
+              <a:rPr lang="en-US" sz="1400" i="1" dirty="0"/>
+              <a:t> and cause the</a:t>
+            </a:r>
+            <a:r>
+              <a:rPr lang="pl-PL" sz="1400" i="1" dirty="0"/>
+              <a:t> </a:t>
+            </a:r>
+            <a:r>
+              <a:rPr lang="en-US" sz="1400" i="1" dirty="0"/>
+              <a:t>connection to be terminated and any open transactions to be rolled back.</a:t>
+            </a:r>
+          </a:p>
+          <a:p>
+            <a:pPr marL="1200150" lvl="2" indent="-285750">
+              <a:buFont typeface="Arial" panose="020B0604020202020204" pitchFamily="34" charset="0"/>
+              <a:buChar char="•"/>
+            </a:pPr>
+            <a:r>
+              <a:rPr lang="en-US" sz="1400" i="1" dirty="0"/>
+              <a:t>Errors with severity level 0 through 10 are </a:t>
+            </a:r>
+            <a:r>
+              <a:rPr lang="en-US" sz="1400" b="1" i="1" dirty="0"/>
+              <a:t>informational only</a:t>
+            </a:r>
+            <a:r>
+              <a:rPr lang="en-US" sz="1400" i="1" dirty="0"/>
+              <a:t>.</a:t>
+            </a:r>
+          </a:p>
+          <a:p>
+            <a:r>
+              <a:rPr lang="en-US" sz="1600" b="1" dirty="0"/>
+              <a:t>State </a:t>
+            </a:r>
+            <a:endParaRPr lang="pl-PL" sz="1600" b="1" dirty="0"/>
+          </a:p>
+          <a:p>
+            <a:r>
+              <a:rPr lang="pl-PL" sz="1600" dirty="0" smtClean="0"/>
+              <a:t>	</a:t>
+            </a:r>
+            <a:r>
+              <a:rPr lang="en-US" sz="1600" dirty="0" smtClean="0"/>
+              <a:t>This </a:t>
+            </a:r>
+            <a:r>
+              <a:rPr lang="en-US" sz="1600" dirty="0"/>
+              <a:t>is an integer with a maximum value of 127, used by Microsoft for internal</a:t>
+            </a:r>
+            <a:r>
+              <a:rPr lang="pl-PL" sz="1600" dirty="0"/>
+              <a:t> </a:t>
+            </a:r>
+            <a:r>
+              <a:rPr lang="en-US" sz="1600" dirty="0"/>
+              <a:t>purposes.</a:t>
+            </a:r>
+          </a:p>
+          <a:p>
+            <a:r>
+              <a:rPr lang="en-US" sz="1600" b="1" dirty="0"/>
+              <a:t>Error message </a:t>
+            </a:r>
+            <a:endParaRPr lang="pl-PL" sz="1600" b="1" dirty="0"/>
+          </a:p>
+          <a:p>
+            <a:pPr lvl="1"/>
+            <a:r>
+              <a:rPr lang="en-US" sz="1600" dirty="0" smtClean="0"/>
+              <a:t>The </a:t>
+            </a:r>
+            <a:r>
+              <a:rPr lang="en-US" sz="1600" dirty="0"/>
+              <a:t>error message can be up to 255 Unicode characters long.</a:t>
+            </a:r>
+          </a:p>
+          <a:p>
+            <a:pPr marL="1200150" lvl="2" indent="-285750">
+              <a:buFont typeface="Arial" panose="020B0604020202020204" pitchFamily="34" charset="0"/>
+              <a:buChar char="•"/>
+            </a:pPr>
+            <a:r>
+              <a:rPr lang="en-US" sz="1400" i="1" dirty="0"/>
+              <a:t>SQL Server error messages are listed in </a:t>
+            </a:r>
+            <a:r>
+              <a:rPr lang="en-US" sz="1400" b="1" i="1" dirty="0" err="1"/>
+              <a:t>sys.messages</a:t>
+            </a:r>
+            <a:r>
+              <a:rPr lang="en-US" sz="1400" i="1" dirty="0"/>
+              <a:t>.</a:t>
+            </a:r>
+          </a:p>
+          <a:p>
+            <a:pPr marL="1200150" lvl="2" indent="-285750">
+              <a:buFont typeface="Arial" panose="020B0604020202020204" pitchFamily="34" charset="0"/>
+              <a:buChar char="•"/>
+            </a:pPr>
+            <a:r>
+              <a:rPr lang="en-US" sz="1400" i="1" dirty="0"/>
+              <a:t>You can add your own custom error messages by using </a:t>
+            </a:r>
+            <a:r>
+              <a:rPr lang="en-US" sz="1400" b="1" i="1" dirty="0" err="1"/>
+              <a:t>sp_addmessage</a:t>
+            </a:r>
+            <a:r>
+              <a:rPr lang="en-US" sz="1400" i="1" dirty="0"/>
+              <a:t>.</a:t>
+            </a:r>
+            <a:endParaRPr lang="pl-PL" sz="1400" i="1" dirty="0"/>
+          </a:p>
+        </p:txBody>
+      </p:sp>
+      <p:sp>
+        <p:nvSpPr>
+          <p:cNvPr id="12" name="Symbol zastępczy stopki 11"/>
+          <p:cNvSpPr>
+            <a:spLocks noGrp="1"/>
+          </p:cNvSpPr>
+          <p:nvPr>
+            <p:ph type="ftr" sz="quarter" idx="11"/>
+          </p:nvPr>
+        </p:nvSpPr>
+        <p:spPr>
+          <a:xfrm>
+            <a:off x="3869268" y="6356350"/>
+            <a:ext cx="5911517" cy="365125"/>
+          </a:xfrm>
+        </p:spPr>
         <p:txBody>
           <a:bodyPr/>
           <a:lstStyle/>
           <a:p>
             <a:r>
-              <a:rPr lang="pl-PL" dirty="0" smtClean="0"/>
-              <a:t>Error </a:t>
-            </a:r>
-            <a:r>
-              <a:rPr lang="pl-PL" dirty="0"/>
-              <a:t>Handling</a:t>
-            </a:r>
-          </a:p>
-        </p:txBody>
-      </p:sp>
-      <p:sp>
-        <p:nvSpPr>
-          <p:cNvPr id="5" name="Symbol zastępczy stopki 4"/>
-          <p:cNvSpPr>
-            <a:spLocks noGrp="1"/>
-          </p:cNvSpPr>
-          <p:nvPr>
-            <p:ph type="ftr" sz="quarter" idx="11"/>
-          </p:nvPr>
-        </p:nvSpPr>
-        <p:spPr/>
-        <p:txBody>
-          <a:bodyPr/>
-          <a:lstStyle/>
-          <a:p>
-            <a:r>
-              <a:rPr lang="en-US" smtClean="0"/>
+              <a:rPr lang="en-US" dirty="0" smtClean="0"/>
               <a:t>Developing SQL Databases</a:t>
             </a:r>
-            <a:endParaRPr lang="en-US" dirty="0"/>
-          </a:p>
-        </p:txBody>
-      </p:sp>
-      <p:sp>
-        <p:nvSpPr>
-          <p:cNvPr id="6" name="Content Placeholder 5"/>
-          <p:cNvSpPr>
-            <a:spLocks noGrp="1"/>
-          </p:cNvSpPr>
-          <p:nvPr>
-            <p:ph idx="1"/>
-          </p:nvPr>
-        </p:nvSpPr>
-        <p:spPr/>
-        <p:txBody>
-          <a:bodyPr/>
-          <a:lstStyle/>
-          <a:p>
-            <a:endParaRPr lang="pl-PL"/>
+            <a:endParaRPr lang="pl-PL" dirty="0"/>
           </a:p>
         </p:txBody>
       </p:sp>
     </p:spTree>
     <p:extLst>
       <p:ext uri="{BB962C8B-B14F-4D97-AF65-F5344CB8AC3E}">
-        <p14:creationId xmlns:p14="http://schemas.microsoft.com/office/powerpoint/2010/main" val="1995528927"/>
+        <p14:creationId xmlns:p14="http://schemas.microsoft.com/office/powerpoint/2010/main" val="137168500"/>
       </p:ext>
     </p:extLst>
   </p:cSld>
@@ -4759,7 +4902,7 @@
         <p:spPr>
           <a:xfrm>
             <a:off x="489706" y="624631"/>
-            <a:ext cx="10374037" cy="5232202"/>
+            <a:ext cx="10374037" cy="6063198"/>
           </a:xfrm>
           <a:prstGeom prst="rect">
             <a:avLst/>
@@ -4774,7 +4917,7 @@
           <a:p>
             <a:r>
               <a:rPr lang="pl-PL" sz="2800" b="1" dirty="0"/>
-              <a:t>ERROR MESSAGE</a:t>
+              <a:t>RAISERROR</a:t>
             </a:r>
             <a:endParaRPr lang="en-US" sz="2800" b="1" dirty="0"/>
           </a:p>
@@ -4782,205 +4925,174 @@
             <a:endParaRPr lang="en-US" dirty="0"/>
           </a:p>
           <a:p>
-            <a:r>
-              <a:rPr lang="en-US" b="1" dirty="0">
-                <a:highlight>
-                  <a:srgbClr val="FFFF00"/>
-                </a:highlight>
-              </a:rPr>
-              <a:t>Error number </a:t>
-            </a:r>
+            <a:pPr lvl="1"/>
             <a:r>
               <a:rPr lang="en-US" dirty="0"/>
-              <a:t>The error number is an integer value.</a:t>
-            </a:r>
-          </a:p>
-          <a:p>
-            <a:pPr marL="285750" indent="-285750">
+              <a:t>Generates an error message and initiates error processing for the session. RAISERROR can either reference a user-defined message stored in the </a:t>
+            </a:r>
+            <a:r>
+              <a:rPr lang="en-US" dirty="0" err="1"/>
+              <a:t>sys.messages</a:t>
+            </a:r>
+            <a:r>
+              <a:rPr lang="en-US" dirty="0"/>
+              <a:t> catalog view or build a message dynamically.</a:t>
+            </a:r>
+          </a:p>
+          <a:p>
+            <a:pPr lvl="1"/>
+            <a:endParaRPr lang="en-US" dirty="0"/>
+          </a:p>
+          <a:p>
+            <a:pPr lvl="1"/>
+            <a:r>
+              <a:rPr lang="en-US" dirty="0"/>
+              <a:t>The errors generated by RAISERROR operate the same as errors generated by the Database Engine code. </a:t>
+            </a:r>
+            <a:endParaRPr lang="pl-PL" dirty="0"/>
+          </a:p>
+          <a:p>
+            <a:pPr lvl="1"/>
+            <a:endParaRPr lang="pl-PL" dirty="0"/>
+          </a:p>
+          <a:p>
+            <a:pPr lvl="1"/>
+            <a:r>
+              <a:rPr lang="en-US" dirty="0"/>
+              <a:t>The values specified by RAISERROR are reported by the </a:t>
+            </a:r>
+            <a:endParaRPr lang="pl-PL" dirty="0" smtClean="0"/>
+          </a:p>
+          <a:p>
+            <a:pPr marL="1200150" lvl="2" indent="-285750">
               <a:buFont typeface="Arial" panose="020B0604020202020204" pitchFamily="34" charset="0"/>
               <a:buChar char="•"/>
             </a:pPr>
             <a:r>
-              <a:rPr lang="en-US" dirty="0"/>
-              <a:t>SQL Server error messages are numbered from 1 through 49999.</a:t>
-            </a:r>
-          </a:p>
-          <a:p>
-            <a:pPr marL="285750" indent="-285750">
+              <a:rPr lang="en-US" sz="1600" i="1" dirty="0" smtClean="0"/>
+              <a:t>ERROR_LINE</a:t>
+            </a:r>
+            <a:r>
+              <a:rPr lang="en-US" sz="1600" i="1" dirty="0"/>
+              <a:t>, </a:t>
+            </a:r>
+            <a:endParaRPr lang="pl-PL" sz="1600" i="1" dirty="0" smtClean="0"/>
+          </a:p>
+          <a:p>
+            <a:pPr marL="1200150" lvl="2" indent="-285750">
               <a:buFont typeface="Arial" panose="020B0604020202020204" pitchFamily="34" charset="0"/>
               <a:buChar char="•"/>
             </a:pPr>
             <a:r>
-              <a:rPr lang="en-US" dirty="0"/>
-              <a:t>Custom error messages are numbered 50001 and higher.</a:t>
-            </a:r>
-          </a:p>
-          <a:p>
-            <a:pPr marL="285750" indent="-285750">
+              <a:rPr lang="en-US" sz="1600" i="1" dirty="0" smtClean="0"/>
+              <a:t>ERROR_MESSAGE</a:t>
+            </a:r>
+            <a:r>
+              <a:rPr lang="en-US" sz="1600" i="1" dirty="0"/>
+              <a:t>,</a:t>
+            </a:r>
+            <a:r>
+              <a:rPr lang="pl-PL" sz="1600" i="1" dirty="0"/>
+              <a:t> </a:t>
+            </a:r>
+            <a:endParaRPr lang="pl-PL" sz="1600" i="1" dirty="0" smtClean="0"/>
+          </a:p>
+          <a:p>
+            <a:pPr marL="1200150" lvl="2" indent="-285750">
               <a:buFont typeface="Arial" panose="020B0604020202020204" pitchFamily="34" charset="0"/>
               <a:buChar char="•"/>
             </a:pPr>
             <a:r>
-              <a:rPr lang="en-US" dirty="0"/>
-              <a:t>The error number 50000 is reserved for a custom message that does not have a</a:t>
-            </a:r>
-            <a:r>
-              <a:rPr lang="pl-PL" dirty="0"/>
-              <a:t> </a:t>
-            </a:r>
-            <a:r>
-              <a:rPr lang="en-US" dirty="0"/>
-              <a:t>custom error number.</a:t>
-            </a:r>
-          </a:p>
-          <a:p>
-            <a:r>
-              <a:rPr lang="en-US" b="1" dirty="0">
-                <a:highlight>
-                  <a:srgbClr val="FFFF00"/>
-                </a:highlight>
-              </a:rPr>
-              <a:t>Severity level </a:t>
-            </a:r>
-            <a:r>
-              <a:rPr lang="en-US" dirty="0"/>
-              <a:t>SQL Server defines 26 severity levels numbered from 0 through 25.</a:t>
-            </a:r>
-          </a:p>
-          <a:p>
-            <a:pPr marL="285750" indent="-285750">
+              <a:rPr lang="en-US" sz="1600" i="1" dirty="0" smtClean="0"/>
+              <a:t>ERROR_NUMBER</a:t>
+            </a:r>
+            <a:r>
+              <a:rPr lang="en-US" sz="1600" i="1" dirty="0"/>
+              <a:t>, </a:t>
+            </a:r>
+            <a:endParaRPr lang="pl-PL" sz="1600" i="1" dirty="0" smtClean="0"/>
+          </a:p>
+          <a:p>
+            <a:pPr marL="1200150" lvl="2" indent="-285750">
               <a:buFont typeface="Arial" panose="020B0604020202020204" pitchFamily="34" charset="0"/>
               <a:buChar char="•"/>
             </a:pPr>
             <a:r>
-              <a:rPr lang="en-US" dirty="0"/>
-              <a:t>As a general rule, errors with a severity level of 16 or higher are logged automatically</a:t>
-            </a:r>
-            <a:r>
-              <a:rPr lang="pl-PL" dirty="0"/>
-              <a:t> </a:t>
-            </a:r>
-            <a:r>
-              <a:rPr lang="en-US" dirty="0"/>
-              <a:t>to the SQL Server log and the Windows Application log.</a:t>
-            </a:r>
-          </a:p>
-          <a:p>
-            <a:pPr marL="285750" indent="-285750">
+              <a:rPr lang="en-US" sz="1600" i="1" dirty="0" smtClean="0"/>
+              <a:t>ERROR_PROCEDURE</a:t>
+            </a:r>
+            <a:r>
+              <a:rPr lang="en-US" sz="1600" i="1" dirty="0"/>
+              <a:t>, </a:t>
+            </a:r>
+            <a:endParaRPr lang="pl-PL" sz="1600" i="1" dirty="0" smtClean="0"/>
+          </a:p>
+          <a:p>
+            <a:pPr marL="1200150" lvl="2" indent="-285750">
               <a:buFont typeface="Arial" panose="020B0604020202020204" pitchFamily="34" charset="0"/>
               <a:buChar char="•"/>
             </a:pPr>
             <a:r>
-              <a:rPr lang="en-US" dirty="0"/>
-              <a:t>Errors with a severity level from 19 through 25 can be specified only by members of</a:t>
-            </a:r>
-            <a:r>
-              <a:rPr lang="pl-PL" dirty="0"/>
-              <a:t> </a:t>
-            </a:r>
-            <a:r>
-              <a:rPr lang="en-US" dirty="0"/>
-              <a:t>the sysadmin fixed server role.</a:t>
-            </a:r>
-          </a:p>
-          <a:p>
-            <a:pPr marL="285750" indent="-285750">
+              <a:rPr lang="en-US" sz="1600" i="1" dirty="0" smtClean="0"/>
+              <a:t>ERROR_SEVERITY</a:t>
+            </a:r>
+            <a:r>
+              <a:rPr lang="en-US" sz="1600" i="1" dirty="0"/>
+              <a:t>, </a:t>
+            </a:r>
+            <a:endParaRPr lang="pl-PL" sz="1600" i="1" dirty="0" smtClean="0"/>
+          </a:p>
+          <a:p>
+            <a:pPr marL="1200150" lvl="2" indent="-285750">
               <a:buFont typeface="Arial" panose="020B0604020202020204" pitchFamily="34" charset="0"/>
               <a:buChar char="•"/>
             </a:pPr>
             <a:r>
-              <a:rPr lang="en-US" dirty="0"/>
-              <a:t>Errors with a severity level from 20 through 25 are considered fatal and cause the</a:t>
-            </a:r>
-            <a:r>
-              <a:rPr lang="pl-PL" dirty="0"/>
-              <a:t> </a:t>
-            </a:r>
-            <a:r>
-              <a:rPr lang="en-US" dirty="0"/>
-              <a:t>connection to be terminated and any open transactions to be rolled back.</a:t>
-            </a:r>
-          </a:p>
-          <a:p>
-            <a:pPr marL="285750" indent="-285750">
+              <a:rPr lang="en-US" sz="1600" i="1" dirty="0" smtClean="0"/>
+              <a:t>ERROR_STATE</a:t>
+            </a:r>
+            <a:r>
+              <a:rPr lang="en-US" sz="1600" i="1" dirty="0"/>
+              <a:t>, </a:t>
+            </a:r>
+            <a:endParaRPr lang="pl-PL" sz="1600" i="1" dirty="0" smtClean="0"/>
+          </a:p>
+          <a:p>
+            <a:pPr marL="1200150" lvl="2" indent="-285750">
               <a:buFont typeface="Arial" panose="020B0604020202020204" pitchFamily="34" charset="0"/>
               <a:buChar char="•"/>
             </a:pPr>
             <a:r>
+              <a:rPr lang="en-US" sz="1600" i="1" dirty="0" smtClean="0"/>
+              <a:t>@@</a:t>
+            </a:r>
+            <a:r>
+              <a:rPr lang="en-US" sz="1600" i="1" dirty="0"/>
+              <a:t>ERROR </a:t>
+            </a:r>
+            <a:endParaRPr lang="pl-PL" sz="1600" i="1" dirty="0" smtClean="0"/>
+          </a:p>
+          <a:p>
+            <a:pPr lvl="1"/>
+            <a:r>
+              <a:rPr lang="en-US" dirty="0" smtClean="0"/>
+              <a:t>system </a:t>
+            </a:r>
+            <a:r>
               <a:rPr lang="en-US" dirty="0"/>
-              <a:t>Errors with severity level 0 through 10 are informational only.</a:t>
-            </a:r>
-          </a:p>
-          <a:p>
-            <a:r>
-              <a:rPr lang="en-US" b="1" dirty="0">
-                <a:highlight>
-                  <a:srgbClr val="FFFF00"/>
-                </a:highlight>
-              </a:rPr>
-              <a:t>State </a:t>
-            </a:r>
+              <a:t>functions. </a:t>
+            </a:r>
+            <a:endParaRPr lang="pl-PL" dirty="0"/>
+          </a:p>
+          <a:p>
+            <a:pPr lvl="1"/>
+            <a:endParaRPr lang="pl-PL" dirty="0"/>
+          </a:p>
+          <a:p>
+            <a:pPr lvl="1"/>
             <a:r>
               <a:rPr lang="en-US" dirty="0"/>
-              <a:t>This is an integer with a maximum value of 127, used by Microsoft for internal</a:t>
-            </a:r>
-            <a:r>
-              <a:rPr lang="pl-PL" dirty="0"/>
-              <a:t> </a:t>
-            </a:r>
-            <a:r>
-              <a:rPr lang="en-US" dirty="0"/>
-              <a:t>purposes.</a:t>
-            </a:r>
-          </a:p>
-          <a:p>
-            <a:r>
-              <a:rPr lang="en-US" b="1" dirty="0">
-                <a:highlight>
-                  <a:srgbClr val="FFFF00"/>
-                </a:highlight>
-              </a:rPr>
-              <a:t>Error message </a:t>
-            </a:r>
-            <a:r>
-              <a:rPr lang="en-US" dirty="0"/>
-              <a:t>The error message can be up to 255 Unicode characters long.</a:t>
-            </a:r>
-          </a:p>
-          <a:p>
-            <a:pPr marL="285750" indent="-285750">
-              <a:buFont typeface="Arial" panose="020B0604020202020204" pitchFamily="34" charset="0"/>
-              <a:buChar char="•"/>
-            </a:pPr>
-            <a:r>
-              <a:rPr lang="en-US" dirty="0"/>
-              <a:t>SQL Server error messages are listed in </a:t>
-            </a:r>
-            <a:r>
-              <a:rPr lang="en-US" dirty="0" err="1"/>
-              <a:t>sys.messages</a:t>
-            </a:r>
-            <a:r>
-              <a:rPr lang="en-US" dirty="0"/>
-              <a:t>.</a:t>
-            </a:r>
-          </a:p>
-          <a:p>
-            <a:pPr marL="285750" indent="-285750">
-              <a:buFont typeface="Arial" panose="020B0604020202020204" pitchFamily="34" charset="0"/>
-              <a:buChar char="•"/>
-            </a:pPr>
-            <a:r>
-              <a:rPr lang="en-US" dirty="0"/>
-              <a:t>You can add your own custom error messages by using </a:t>
-            </a:r>
-            <a:r>
-              <a:rPr lang="en-US" dirty="0" err="1"/>
-              <a:t>sp_addmessage</a:t>
-            </a:r>
-            <a:r>
-              <a:rPr lang="en-US" dirty="0"/>
-              <a:t>.</a:t>
+              <a:t>When RAISERROR is run with a severity of 11 or higher in a TRY block, it transfers control to the associated CATCH block.</a:t>
             </a:r>
             <a:endParaRPr lang="pl-PL" dirty="0"/>
           </a:p>
@@ -5017,7 +5129,7 @@
     </p:spTree>
     <p:extLst>
       <p:ext uri="{BB962C8B-B14F-4D97-AF65-F5344CB8AC3E}">
-        <p14:creationId xmlns:p14="http://schemas.microsoft.com/office/powerpoint/2010/main" val="137168500"/>
+        <p14:creationId xmlns:p14="http://schemas.microsoft.com/office/powerpoint/2010/main" val="3910731411"/>
       </p:ext>
     </p:extLst>
   </p:cSld>
@@ -5053,7 +5165,7 @@
         <p:spPr>
           <a:xfrm>
             <a:off x="489706" y="624631"/>
-            <a:ext cx="10374037" cy="3847207"/>
+            <a:ext cx="10374037" cy="2646878"/>
           </a:xfrm>
           <a:prstGeom prst="rect">
             <a:avLst/>
@@ -5078,54 +5190,67 @@
           <a:p>
             <a:r>
               <a:rPr lang="en-US" dirty="0"/>
-              <a:t>Generates an error message and initiates error processing for the session. RAISERROR can either reference a user-defined message stored in the </a:t>
-            </a:r>
-            <a:r>
-              <a:rPr lang="en-US" dirty="0" err="1"/>
-              <a:t>sys.messages</a:t>
-            </a:r>
-            <a:r>
-              <a:rPr lang="en-US" dirty="0"/>
-              <a:t> catalog view or build a message dynamically.</a:t>
-            </a:r>
-          </a:p>
-          <a:p>
-            <a:endParaRPr lang="en-US" dirty="0"/>
-          </a:p>
-          <a:p>
-            <a:r>
-              <a:rPr lang="en-US" dirty="0"/>
-              <a:t>The errors generated by RAISERROR operate the same as errors generated by the Database Engine code. </a:t>
+              <a:t>Some more advanced features of RAISERROR include the following:</a:t>
             </a:r>
             <a:endParaRPr lang="pl-PL" dirty="0"/>
           </a:p>
           <a:p>
-            <a:endParaRPr lang="pl-PL" dirty="0"/>
-          </a:p>
-          <a:p>
-            <a:r>
-              <a:rPr lang="en-US" dirty="0"/>
-              <a:t>The values specified by RAISERROR are reported by the ERROR_LINE, ERROR_MESSAGE,</a:t>
-            </a:r>
-            <a:r>
-              <a:rPr lang="pl-PL" dirty="0"/>
-              <a:t> </a:t>
-            </a:r>
-            <a:r>
-              <a:rPr lang="en-US" dirty="0"/>
-              <a:t>ERROR_NUMBER, ERROR_PROCEDURE, ERROR_SEVERITY, ERROR_STATE, and @@ERROR system functions. </a:t>
-            </a:r>
-            <a:endParaRPr lang="pl-PL" dirty="0"/>
-          </a:p>
-          <a:p>
-            <a:endParaRPr lang="pl-PL" dirty="0"/>
-          </a:p>
-          <a:p>
-            <a:r>
-              <a:rPr lang="en-US" dirty="0"/>
-              <a:t>When RAISERROR is run with a severity of 11 or higher in a TRY block, it transfers control to the associated CATCH block.</a:t>
-            </a:r>
-            <a:endParaRPr lang="pl-PL" dirty="0"/>
+            <a:endParaRPr lang="en-US" dirty="0"/>
+          </a:p>
+          <a:p>
+            <a:pPr marL="742950" lvl="1" indent="-285750">
+              <a:buFont typeface="Arial" panose="020B0604020202020204" pitchFamily="34" charset="0"/>
+              <a:buChar char="•"/>
+            </a:pPr>
+            <a:r>
+              <a:rPr lang="en-US" sz="1600" dirty="0"/>
+              <a:t>You can issue </a:t>
+            </a:r>
+            <a:r>
+              <a:rPr lang="en-US" sz="1600" b="1" dirty="0"/>
+              <a:t>purely informational messages </a:t>
+            </a:r>
+            <a:r>
+              <a:rPr lang="en-US" sz="1600" dirty="0"/>
+              <a:t>(similar to PRINT) by using a severity level of 0 through 9.</a:t>
+            </a:r>
+          </a:p>
+          <a:p>
+            <a:pPr marL="742950" lvl="1" indent="-285750">
+              <a:buFont typeface="Arial" panose="020B0604020202020204" pitchFamily="34" charset="0"/>
+              <a:buChar char="•"/>
+            </a:pPr>
+            <a:r>
+              <a:rPr lang="en-US" sz="1600" dirty="0"/>
+              <a:t>You can issue RAISERROR with a severity level &gt; 20 if you use the </a:t>
+            </a:r>
+            <a:r>
+              <a:rPr lang="en-US" sz="1600" b="1" dirty="0"/>
+              <a:t>WITH LOG </a:t>
+            </a:r>
+            <a:r>
+              <a:rPr lang="en-US" sz="1600" dirty="0"/>
+              <a:t>option and if you have the SQL Server sysadmin role. SQL Server will then terminate the connection when the error is raised.</a:t>
+            </a:r>
+          </a:p>
+          <a:p>
+            <a:pPr marL="742950" lvl="1" indent="-285750">
+              <a:buFont typeface="Arial" panose="020B0604020202020204" pitchFamily="34" charset="0"/>
+              <a:buChar char="•"/>
+            </a:pPr>
+            <a:r>
+              <a:rPr lang="en-US" sz="1600" dirty="0"/>
+              <a:t>You can use RAISERROR with </a:t>
+            </a:r>
+            <a:r>
+              <a:rPr lang="en-US" sz="1600" b="1" dirty="0"/>
+              <a:t>NOWAIT</a:t>
+            </a:r>
+            <a:r>
+              <a:rPr lang="en-US" sz="1600" dirty="0"/>
+              <a:t> to send messages immediately to the client. The message does not wait in the output buffer before being sent.</a:t>
+            </a:r>
+            <a:endParaRPr lang="pl-PL" sz="1600" dirty="0"/>
           </a:p>
         </p:txBody>
       </p:sp>
@@ -5157,10 +5282,50 @@
           </a:p>
         </p:txBody>
       </p:sp>
+      <p:pic>
+        <p:nvPicPr>
+          <p:cNvPr id="2" name="Obraz 1">
+            <a:extLst>
+              <a:ext uri="{FF2B5EF4-FFF2-40B4-BE49-F238E27FC236}">
+                <a16:creationId xmlns="" xmlns:a16="http://schemas.microsoft.com/office/drawing/2014/main" id="{7739B30E-F679-4AB3-8283-F26E2732C753}"/>
+              </a:ext>
+            </a:extLst>
+          </p:cNvPr>
+          <p:cNvPicPr>
+            <a:picLocks noChangeAspect="1"/>
+          </p:cNvPicPr>
+          <p:nvPr/>
+        </p:nvPicPr>
+        <p:blipFill>
+          <a:blip r:embed="rId2"/>
+          <a:stretch>
+            <a:fillRect/>
+          </a:stretch>
+        </p:blipFill>
+        <p:spPr>
+          <a:xfrm>
+            <a:off x="5329718" y="3595902"/>
+            <a:ext cx="5534025" cy="2200275"/>
+          </a:xfrm>
+          <a:prstGeom prst="rect">
+            <a:avLst/>
+          </a:prstGeom>
+          <a:ln>
+            <a:noFill/>
+          </a:ln>
+          <a:effectLst>
+            <a:outerShdw blurRad="292100" dist="139700" dir="2700000" algn="tl" rotWithShape="0">
+              <a:srgbClr val="333333">
+                <a:alpha val="65000"/>
+              </a:srgbClr>
+            </a:outerShdw>
+          </a:effectLst>
+        </p:spPr>
+      </p:pic>
     </p:spTree>
     <p:extLst>
       <p:ext uri="{BB962C8B-B14F-4D97-AF65-F5344CB8AC3E}">
-        <p14:creationId xmlns:p14="http://schemas.microsoft.com/office/powerpoint/2010/main" val="3910731411"/>
+        <p14:creationId xmlns:p14="http://schemas.microsoft.com/office/powerpoint/2010/main" val="2080887074"/>
       </p:ext>
     </p:extLst>
   </p:cSld>
@@ -5196,7 +5361,7 @@
         <p:spPr>
           <a:xfrm>
             <a:off x="489706" y="624631"/>
-            <a:ext cx="10374037" cy="2739211"/>
+            <a:ext cx="10828151" cy="3293209"/>
           </a:xfrm>
           <a:prstGeom prst="rect">
             <a:avLst/>
@@ -5211,7 +5376,7 @@
           <a:p>
             <a:r>
               <a:rPr lang="pl-PL" sz="2800" b="1" dirty="0"/>
-              <a:t>RAISERROR</a:t>
+              <a:t>THROW</a:t>
             </a:r>
             <a:endParaRPr lang="en-US" sz="2800" b="1" dirty="0"/>
           </a:p>
@@ -5221,67 +5386,135 @@
           <a:p>
             <a:r>
               <a:rPr lang="en-US" dirty="0"/>
-              <a:t>Some more advanced features of RAISERROR include the following:</a:t>
+              <a:t>The THROW command behaves mostly like RAISERROR, with some important exceptions.</a:t>
             </a:r>
             <a:endParaRPr lang="pl-PL" dirty="0"/>
           </a:p>
           <a:p>
-            <a:endParaRPr lang="en-US" dirty="0"/>
-          </a:p>
-          <a:p>
-            <a:pPr marL="285750" indent="-285750">
+            <a:endParaRPr lang="pl-PL" dirty="0"/>
+          </a:p>
+          <a:p>
+            <a:pPr marL="742950" lvl="1" indent="-285750">
               <a:buFont typeface="Arial" panose="020B0604020202020204" pitchFamily="34" charset="0"/>
               <a:buChar char="•"/>
             </a:pPr>
             <a:r>
-              <a:rPr lang="en-US" dirty="0"/>
-              <a:t>You can issue </a:t>
-            </a:r>
-            <a:r>
-              <a:rPr lang="en-US" b="1" dirty="0"/>
-              <a:t>purely informational messages </a:t>
-            </a:r>
-            <a:r>
-              <a:rPr lang="en-US" dirty="0"/>
-              <a:t>(similar to PRINT) by using a severity level of 0 through 9.</a:t>
-            </a:r>
-          </a:p>
-          <a:p>
-            <a:pPr marL="285750" indent="-285750">
+              <a:rPr lang="en-US" i="1" dirty="0"/>
+              <a:t>THROW </a:t>
+            </a:r>
+            <a:r>
+              <a:rPr lang="en-US" b="1" i="1" dirty="0"/>
+              <a:t>does not use parentheses </a:t>
+            </a:r>
+            <a:r>
+              <a:rPr lang="en-US" i="1" dirty="0"/>
+              <a:t>to delimit parameters.</a:t>
+            </a:r>
+          </a:p>
+          <a:p>
+            <a:pPr marL="742950" lvl="1" indent="-285750">
               <a:buFont typeface="Arial" panose="020B0604020202020204" pitchFamily="34" charset="0"/>
               <a:buChar char="•"/>
             </a:pPr>
             <a:r>
-              <a:rPr lang="en-US" dirty="0"/>
-              <a:t>You can issue RAISERROR with a severity level &gt; 20 if you use the </a:t>
-            </a:r>
-            <a:r>
-              <a:rPr lang="en-US" b="1" dirty="0"/>
-              <a:t>WITH LOG </a:t>
-            </a:r>
-            <a:r>
-              <a:rPr lang="en-US" dirty="0"/>
-              <a:t>option and if you have the SQL Server sysadmin role. SQL Server will then terminate the connection when the error is raised.</a:t>
-            </a:r>
-          </a:p>
-          <a:p>
-            <a:pPr marL="285750" indent="-285750">
+              <a:rPr lang="en-US" i="1" dirty="0"/>
+              <a:t>THROW </a:t>
+            </a:r>
+            <a:r>
+              <a:rPr lang="en-US" b="1" i="1" dirty="0"/>
+              <a:t>can be used without parameters</a:t>
+            </a:r>
+            <a:r>
+              <a:rPr lang="en-US" i="1" dirty="0"/>
+              <a:t>, but only in the CATCH block of a TRY/CATCH construct.</a:t>
+            </a:r>
+          </a:p>
+          <a:p>
+            <a:pPr marL="742950" lvl="1" indent="-285750">
               <a:buFont typeface="Arial" panose="020B0604020202020204" pitchFamily="34" charset="0"/>
               <a:buChar char="•"/>
             </a:pPr>
             <a:r>
-              <a:rPr lang="en-US" dirty="0"/>
-              <a:t>You can use RAISERROR with </a:t>
-            </a:r>
-            <a:r>
-              <a:rPr lang="en-US" b="1" dirty="0"/>
-              <a:t>NOWAIT</a:t>
-            </a:r>
-            <a:r>
-              <a:rPr lang="en-US" dirty="0"/>
-              <a:t> to send messages immediately to the client. The message does not wait in the output buffer before being sent.</a:t>
-            </a:r>
-            <a:endParaRPr lang="pl-PL" dirty="0"/>
+              <a:rPr lang="en-US" i="1" dirty="0"/>
+              <a:t>When parameters are supplied, </a:t>
+            </a:r>
+            <a:r>
+              <a:rPr lang="en-US" b="1" i="1" dirty="0" err="1"/>
+              <a:t>error_number</a:t>
+            </a:r>
+            <a:r>
+              <a:rPr lang="en-US" b="1" i="1" dirty="0"/>
+              <a:t>, message, and state are all required</a:t>
+            </a:r>
+            <a:r>
+              <a:rPr lang="en-US" i="1" dirty="0"/>
+              <a:t>.</a:t>
+            </a:r>
+          </a:p>
+          <a:p>
+            <a:pPr marL="742950" lvl="1" indent="-285750">
+              <a:buFont typeface="Arial" panose="020B0604020202020204" pitchFamily="34" charset="0"/>
+              <a:buChar char="•"/>
+            </a:pPr>
+            <a:r>
+              <a:rPr lang="en-US" i="1" dirty="0"/>
+              <a:t>The </a:t>
+            </a:r>
+            <a:r>
+              <a:rPr lang="en-US" b="1" i="1" dirty="0"/>
+              <a:t>state</a:t>
+            </a:r>
+            <a:r>
+              <a:rPr lang="en-US" i="1" dirty="0"/>
+              <a:t> parameter must be an integer that ranges from </a:t>
+            </a:r>
+            <a:r>
+              <a:rPr lang="en-US" b="1" i="1" dirty="0"/>
+              <a:t>0 to 255</a:t>
+            </a:r>
+            <a:r>
+              <a:rPr lang="en-US" i="1" dirty="0"/>
+              <a:t>.</a:t>
+            </a:r>
+          </a:p>
+          <a:p>
+            <a:pPr marL="742950" lvl="1" indent="-285750">
+              <a:buFont typeface="Arial" panose="020B0604020202020204" pitchFamily="34" charset="0"/>
+              <a:buChar char="•"/>
+            </a:pPr>
+            <a:r>
+              <a:rPr lang="en-US" i="1" dirty="0"/>
+              <a:t>Any parameter can be a variable.</a:t>
+            </a:r>
+          </a:p>
+          <a:p>
+            <a:pPr marL="742950" lvl="1" indent="-285750">
+              <a:buFont typeface="Arial" panose="020B0604020202020204" pitchFamily="34" charset="0"/>
+              <a:buChar char="•"/>
+            </a:pPr>
+            <a:r>
+              <a:rPr lang="en-US" i="1" dirty="0"/>
+              <a:t>There is no severity parameter; </a:t>
+            </a:r>
+            <a:r>
+              <a:rPr lang="en-US" b="1" i="1" dirty="0"/>
+              <a:t>the severity is always set to 16</a:t>
+            </a:r>
+            <a:r>
+              <a:rPr lang="en-US" i="1" dirty="0"/>
+              <a:t>.</a:t>
+            </a:r>
+          </a:p>
+          <a:p>
+            <a:pPr marL="742950" lvl="1" indent="-285750">
+              <a:buFont typeface="Arial" panose="020B0604020202020204" pitchFamily="34" charset="0"/>
+              <a:buChar char="•"/>
+            </a:pPr>
+            <a:r>
+              <a:rPr lang="en-US" i="1" dirty="0"/>
+              <a:t>THROW always terminates the batch except when it is used in a TRY block.</a:t>
+            </a:r>
+            <a:endParaRPr lang="pl-PL" i="1" dirty="0"/>
           </a:p>
         </p:txBody>
       </p:sp>
@@ -5318,7 +5551,7 @@
           <p:cNvPr id="2" name="Obraz 1">
             <a:extLst>
               <a:ext uri="{FF2B5EF4-FFF2-40B4-BE49-F238E27FC236}">
-                <a16:creationId xmlns:a16="http://schemas.microsoft.com/office/drawing/2014/main" xmlns="" id="{7739B30E-F679-4AB3-8283-F26E2732C753}"/>
+                <a16:creationId xmlns="" xmlns:a16="http://schemas.microsoft.com/office/drawing/2014/main" id="{903AA94A-28FE-4112-AD46-F8A9EE79619F}"/>
               </a:ext>
             </a:extLst>
           </p:cNvPr>
@@ -5335,18 +5568,28 @@
         </p:blipFill>
         <p:spPr>
           <a:xfrm>
-            <a:off x="5329718" y="4156075"/>
-            <a:ext cx="5534025" cy="2200275"/>
+            <a:off x="8005313" y="3917841"/>
+            <a:ext cx="3312544" cy="2231208"/>
           </a:xfrm>
           <a:prstGeom prst="rect">
             <a:avLst/>
           </a:prstGeom>
+          <a:ln>
+            <a:noFill/>
+          </a:ln>
+          <a:effectLst>
+            <a:outerShdw blurRad="292100" dist="139700" dir="2700000" algn="tl" rotWithShape="0">
+              <a:srgbClr val="333333">
+                <a:alpha val="65000"/>
+              </a:srgbClr>
+            </a:outerShdw>
+          </a:effectLst>
         </p:spPr>
       </p:pic>
     </p:spTree>
     <p:extLst>
       <p:ext uri="{BB962C8B-B14F-4D97-AF65-F5344CB8AC3E}">
-        <p14:creationId xmlns:p14="http://schemas.microsoft.com/office/powerpoint/2010/main" val="2080887074"/>
+        <p14:creationId xmlns:p14="http://schemas.microsoft.com/office/powerpoint/2010/main" val="1278666436"/>
       </p:ext>
     </p:extLst>
   </p:cSld>
@@ -5382,7 +5625,7 @@
         <p:spPr>
           <a:xfrm>
             <a:off x="489706" y="624631"/>
-            <a:ext cx="10828151" cy="3293209"/>
+            <a:ext cx="10374037" cy="523220"/>
           </a:xfrm>
           <a:prstGeom prst="rect">
             <a:avLst/>
@@ -5397,145 +5640,9 @@
           <a:p>
             <a:r>
               <a:rPr lang="pl-PL" sz="2800" b="1" dirty="0"/>
-              <a:t>THROW</a:t>
+              <a:t>TRY_CAST, TRY_CONVERT, TRY_PARSE</a:t>
             </a:r>
             <a:endParaRPr lang="en-US" sz="2800" b="1" dirty="0"/>
-          </a:p>
-          <a:p>
-            <a:endParaRPr lang="en-US" dirty="0"/>
-          </a:p>
-          <a:p>
-            <a:r>
-              <a:rPr lang="en-US" dirty="0"/>
-              <a:t>The THROW command behaves mostly like RAISERROR, with some important exceptions.</a:t>
-            </a:r>
-            <a:endParaRPr lang="pl-PL" dirty="0"/>
-          </a:p>
-          <a:p>
-            <a:endParaRPr lang="pl-PL" dirty="0"/>
-          </a:p>
-          <a:p>
-            <a:pPr marL="285750" indent="-285750">
-              <a:buFont typeface="Arial" panose="020B0604020202020204" pitchFamily="34" charset="0"/>
-              <a:buChar char="•"/>
-            </a:pPr>
-            <a:r>
-              <a:rPr lang="en-US" dirty="0"/>
-              <a:t>THROW </a:t>
-            </a:r>
-            <a:r>
-              <a:rPr lang="en-US" b="1" dirty="0"/>
-              <a:t>does not use parentheses </a:t>
-            </a:r>
-            <a:r>
-              <a:rPr lang="en-US" dirty="0"/>
-              <a:t>to delimit parameters.</a:t>
-            </a:r>
-          </a:p>
-          <a:p>
-            <a:pPr marL="285750" indent="-285750">
-              <a:buFont typeface="Arial" panose="020B0604020202020204" pitchFamily="34" charset="0"/>
-              <a:buChar char="•"/>
-            </a:pPr>
-            <a:r>
-              <a:rPr lang="en-US" dirty="0"/>
-              <a:t>THROW </a:t>
-            </a:r>
-            <a:r>
-              <a:rPr lang="en-US" b="1" dirty="0"/>
-              <a:t>can be used without parameters</a:t>
-            </a:r>
-            <a:r>
-              <a:rPr lang="en-US" dirty="0"/>
-              <a:t>, but only in the CATCH block of a TRY/CATCH construct.</a:t>
-            </a:r>
-          </a:p>
-          <a:p>
-            <a:pPr marL="285750" indent="-285750">
-              <a:buFont typeface="Arial" panose="020B0604020202020204" pitchFamily="34" charset="0"/>
-              <a:buChar char="•"/>
-            </a:pPr>
-            <a:r>
-              <a:rPr lang="en-US" dirty="0"/>
-              <a:t>When parameters are supplied, </a:t>
-            </a:r>
-            <a:r>
-              <a:rPr lang="en-US" b="1" dirty="0" err="1"/>
-              <a:t>error_number</a:t>
-            </a:r>
-            <a:r>
-              <a:rPr lang="en-US" b="1" dirty="0"/>
-              <a:t>, message, and state are all required</a:t>
-            </a:r>
-            <a:r>
-              <a:rPr lang="en-US" dirty="0"/>
-              <a:t>.</a:t>
-            </a:r>
-          </a:p>
-          <a:p>
-            <a:pPr marL="285750" indent="-285750">
-              <a:buFont typeface="Arial" panose="020B0604020202020204" pitchFamily="34" charset="0"/>
-              <a:buChar char="•"/>
-            </a:pPr>
-            <a:r>
-              <a:rPr lang="en-US" dirty="0"/>
-              <a:t>The </a:t>
-            </a:r>
-            <a:r>
-              <a:rPr lang="en-US" b="1" dirty="0"/>
-              <a:t>state</a:t>
-            </a:r>
-            <a:r>
-              <a:rPr lang="en-US" dirty="0"/>
-              <a:t> parameter must be an integer that ranges from </a:t>
-            </a:r>
-            <a:r>
-              <a:rPr lang="en-US" b="1" dirty="0"/>
-              <a:t>0 to 255</a:t>
-            </a:r>
-            <a:r>
-              <a:rPr lang="en-US" dirty="0"/>
-              <a:t>.</a:t>
-            </a:r>
-          </a:p>
-          <a:p>
-            <a:pPr marL="285750" indent="-285750">
-              <a:buFont typeface="Arial" panose="020B0604020202020204" pitchFamily="34" charset="0"/>
-              <a:buChar char="•"/>
-            </a:pPr>
-            <a:r>
-              <a:rPr lang="en-US" dirty="0"/>
-              <a:t>Any parameter can be a variable.</a:t>
-            </a:r>
-          </a:p>
-          <a:p>
-            <a:pPr marL="285750" indent="-285750">
-              <a:buFont typeface="Arial" panose="020B0604020202020204" pitchFamily="34" charset="0"/>
-              <a:buChar char="•"/>
-            </a:pPr>
-            <a:r>
-              <a:rPr lang="en-US" dirty="0"/>
-              <a:t>There is no severity parameter; </a:t>
-            </a:r>
-            <a:r>
-              <a:rPr lang="en-US" b="1" dirty="0"/>
-              <a:t>the severity is always set to 16</a:t>
-            </a:r>
-            <a:r>
-              <a:rPr lang="en-US" dirty="0"/>
-              <a:t>.</a:t>
-            </a:r>
-          </a:p>
-          <a:p>
-            <a:pPr marL="285750" indent="-285750">
-              <a:buFont typeface="Arial" panose="020B0604020202020204" pitchFamily="34" charset="0"/>
-              <a:buChar char="•"/>
-            </a:pPr>
-            <a:r>
-              <a:rPr lang="en-US" dirty="0"/>
-              <a:t>THROW always terminates the batch except when it is used in a TRY block.</a:t>
-            </a:r>
-            <a:endParaRPr lang="pl-PL" dirty="0"/>
           </a:p>
         </p:txBody>
       </p:sp>
@@ -5572,7 +5679,7 @@
           <p:cNvPr id="2" name="Obraz 1">
             <a:extLst>
               <a:ext uri="{FF2B5EF4-FFF2-40B4-BE49-F238E27FC236}">
-                <a16:creationId xmlns:a16="http://schemas.microsoft.com/office/drawing/2014/main" xmlns="" id="{903AA94A-28FE-4112-AD46-F8A9EE79619F}"/>
+                <a16:creationId xmlns="" xmlns:a16="http://schemas.microsoft.com/office/drawing/2014/main" id="{30F4D9E1-71E3-440D-A037-EF298257A85A}"/>
               </a:ext>
             </a:extLst>
           </p:cNvPr>
@@ -5589,18 +5696,68 @@
         </p:blipFill>
         <p:spPr>
           <a:xfrm>
-            <a:off x="8005313" y="3917841"/>
-            <a:ext cx="3312544" cy="2231208"/>
+            <a:off x="489706" y="1463993"/>
+            <a:ext cx="5661712" cy="2150122"/>
           </a:xfrm>
           <a:prstGeom prst="rect">
             <a:avLst/>
           </a:prstGeom>
+          <a:ln>
+            <a:noFill/>
+          </a:ln>
+          <a:effectLst>
+            <a:outerShdw blurRad="292100" dist="139700" dir="2700000" algn="tl" rotWithShape="0">
+              <a:srgbClr val="333333">
+                <a:alpha val="65000"/>
+              </a:srgbClr>
+            </a:outerShdw>
+          </a:effectLst>
+        </p:spPr>
+      </p:pic>
+      <p:pic>
+        <p:nvPicPr>
+          <p:cNvPr id="3" name="Obraz 2">
+            <a:extLst>
+              <a:ext uri="{FF2B5EF4-FFF2-40B4-BE49-F238E27FC236}">
+                <a16:creationId xmlns="" xmlns:a16="http://schemas.microsoft.com/office/drawing/2014/main" id="{F3C272B1-9E4D-4C3E-AB99-509E6873A75B}"/>
+              </a:ext>
+            </a:extLst>
+          </p:cNvPr>
+          <p:cNvPicPr>
+            <a:picLocks noChangeAspect="1"/>
+          </p:cNvPicPr>
+          <p:nvPr/>
+        </p:nvPicPr>
+        <p:blipFill>
+          <a:blip r:embed="rId3"/>
+          <a:stretch>
+            <a:fillRect/>
+          </a:stretch>
+        </p:blipFill>
+        <p:spPr>
+          <a:xfrm>
+            <a:off x="489706" y="3890086"/>
+            <a:ext cx="5819775" cy="2143125"/>
+          </a:xfrm>
+          <a:prstGeom prst="rect">
+            <a:avLst/>
+          </a:prstGeom>
+          <a:ln>
+            <a:noFill/>
+          </a:ln>
+          <a:effectLst>
+            <a:outerShdw blurRad="292100" dist="139700" dir="2700000" algn="tl" rotWithShape="0">
+              <a:srgbClr val="333333">
+                <a:alpha val="65000"/>
+              </a:srgbClr>
+            </a:outerShdw>
+          </a:effectLst>
         </p:spPr>
       </p:pic>
     </p:spTree>
     <p:extLst>
       <p:ext uri="{BB962C8B-B14F-4D97-AF65-F5344CB8AC3E}">
-        <p14:creationId xmlns:p14="http://schemas.microsoft.com/office/powerpoint/2010/main" val="1278666436"/>
+        <p14:creationId xmlns:p14="http://schemas.microsoft.com/office/powerpoint/2010/main" val="1708061939"/>
       </p:ext>
     </p:extLst>
   </p:cSld>
@@ -5635,154 +5792,6 @@
         </p:nvSpPr>
         <p:spPr>
           <a:xfrm>
-            <a:off x="489706" y="624631"/>
-            <a:ext cx="10374037" cy="523220"/>
-          </a:xfrm>
-          <a:prstGeom prst="rect">
-            <a:avLst/>
-          </a:prstGeom>
-          <a:noFill/>
-        </p:spPr>
-        <p:txBody>
-          <a:bodyPr wrap="square" rtlCol="0">
-            <a:spAutoFit/>
-          </a:bodyPr>
-          <a:lstStyle/>
-          <a:p>
-            <a:r>
-              <a:rPr lang="pl-PL" sz="2800" b="1" dirty="0"/>
-              <a:t>TRY_CAST, TRY_CONVERT, TRY_PARSE</a:t>
-            </a:r>
-            <a:endParaRPr lang="en-US" sz="2800" b="1" dirty="0"/>
-          </a:p>
-        </p:txBody>
-      </p:sp>
-      <p:sp>
-        <p:nvSpPr>
-          <p:cNvPr id="12" name="Symbol zastępczy stopki 11"/>
-          <p:cNvSpPr>
-            <a:spLocks noGrp="1"/>
-          </p:cNvSpPr>
-          <p:nvPr>
-            <p:ph type="ftr" sz="quarter" idx="11"/>
-          </p:nvPr>
-        </p:nvSpPr>
-        <p:spPr>
-          <a:xfrm>
-            <a:off x="3869268" y="6356350"/>
-            <a:ext cx="5911517" cy="365125"/>
-          </a:xfrm>
-        </p:spPr>
-        <p:txBody>
-          <a:bodyPr/>
-          <a:lstStyle/>
-          <a:p>
-            <a:r>
-              <a:rPr lang="en-US" smtClean="0"/>
-              <a:t>Developing SQL Databases</a:t>
-            </a:r>
-            <a:endParaRPr lang="pl-PL" dirty="0"/>
-          </a:p>
-        </p:txBody>
-      </p:sp>
-      <p:pic>
-        <p:nvPicPr>
-          <p:cNvPr id="2" name="Obraz 1">
-            <a:extLst>
-              <a:ext uri="{FF2B5EF4-FFF2-40B4-BE49-F238E27FC236}">
-                <a16:creationId xmlns:a16="http://schemas.microsoft.com/office/drawing/2014/main" xmlns="" id="{30F4D9E1-71E3-440D-A037-EF298257A85A}"/>
-              </a:ext>
-            </a:extLst>
-          </p:cNvPr>
-          <p:cNvPicPr>
-            <a:picLocks noChangeAspect="1"/>
-          </p:cNvPicPr>
-          <p:nvPr/>
-        </p:nvPicPr>
-        <p:blipFill>
-          <a:blip r:embed="rId2"/>
-          <a:stretch>
-            <a:fillRect/>
-          </a:stretch>
-        </p:blipFill>
-        <p:spPr>
-          <a:xfrm>
-            <a:off x="489706" y="1463993"/>
-            <a:ext cx="5661712" cy="2150122"/>
-          </a:xfrm>
-          <a:prstGeom prst="rect">
-            <a:avLst/>
-          </a:prstGeom>
-        </p:spPr>
-      </p:pic>
-      <p:pic>
-        <p:nvPicPr>
-          <p:cNvPr id="3" name="Obraz 2">
-            <a:extLst>
-              <a:ext uri="{FF2B5EF4-FFF2-40B4-BE49-F238E27FC236}">
-                <a16:creationId xmlns:a16="http://schemas.microsoft.com/office/drawing/2014/main" xmlns="" id="{F3C272B1-9E4D-4C3E-AB99-509E6873A75B}"/>
-              </a:ext>
-            </a:extLst>
-          </p:cNvPr>
-          <p:cNvPicPr>
-            <a:picLocks noChangeAspect="1"/>
-          </p:cNvPicPr>
-          <p:nvPr/>
-        </p:nvPicPr>
-        <p:blipFill>
-          <a:blip r:embed="rId3"/>
-          <a:stretch>
-            <a:fillRect/>
-          </a:stretch>
-        </p:blipFill>
-        <p:spPr>
-          <a:xfrm>
-            <a:off x="489706" y="3890086"/>
-            <a:ext cx="5819775" cy="2143125"/>
-          </a:xfrm>
-          <a:prstGeom prst="rect">
-            <a:avLst/>
-          </a:prstGeom>
-        </p:spPr>
-      </p:pic>
-    </p:spTree>
-    <p:extLst>
-      <p:ext uri="{BB962C8B-B14F-4D97-AF65-F5344CB8AC3E}">
-        <p14:creationId xmlns:p14="http://schemas.microsoft.com/office/powerpoint/2010/main" val="1708061939"/>
-      </p:ext>
-    </p:extLst>
-  </p:cSld>
-  <p:clrMapOvr>
-    <a:masterClrMapping/>
-  </p:clrMapOvr>
-</p:sld>
-</file>
-
-<file path=ppt/slides/slide8.xml><?xml version="1.0" encoding="utf-8"?>
-<p:sld xmlns:a="http://schemas.openxmlformats.org/drawingml/2006/main" xmlns:r="http://schemas.openxmlformats.org/officeDocument/2006/relationships" xmlns:p="http://schemas.openxmlformats.org/presentationml/2006/main">
-  <p:cSld>
-    <p:spTree>
-      <p:nvGrpSpPr>
-        <p:cNvPr id="1" name=""/>
-        <p:cNvGrpSpPr/>
-        <p:nvPr/>
-      </p:nvGrpSpPr>
-      <p:grpSpPr>
-        <a:xfrm>
-          <a:off x="0" y="0"/>
-          <a:ext cx="0" cy="0"/>
-          <a:chOff x="0" y="0"/>
-          <a:chExt cx="0" cy="0"/>
-        </a:xfrm>
-      </p:grpSpPr>
-      <p:sp>
-        <p:nvSpPr>
-          <p:cNvPr id="9" name="pole tekstowe 8"/>
-          <p:cNvSpPr txBox="1"/>
-          <p:nvPr/>
-        </p:nvSpPr>
-        <p:spPr>
-          <a:xfrm>
             <a:off x="489707" y="624631"/>
             <a:ext cx="6311926" cy="4124206"/>
           </a:xfrm>
@@ -5917,7 +5926,7 @@
           <p:cNvPr id="3" name="Obraz 2">
             <a:extLst>
               <a:ext uri="{FF2B5EF4-FFF2-40B4-BE49-F238E27FC236}">
-                <a16:creationId xmlns:a16="http://schemas.microsoft.com/office/drawing/2014/main" xmlns="" id="{BC163CA1-F475-4B0D-BEC6-A2CF580B3103}"/>
+                <a16:creationId xmlns="" xmlns:a16="http://schemas.microsoft.com/office/drawing/2014/main" id="{BC163CA1-F475-4B0D-BEC6-A2CF580B3103}"/>
               </a:ext>
             </a:extLst>
           </p:cNvPr>
@@ -5955,6 +5964,194 @@
 </p:sld>
 </file>
 
+<file path=ppt/slides/slide8.xml><?xml version="1.0" encoding="utf-8"?>
+<p:sld xmlns:a="http://schemas.openxmlformats.org/drawingml/2006/main" xmlns:r="http://schemas.openxmlformats.org/officeDocument/2006/relationships" xmlns:p="http://schemas.openxmlformats.org/presentationml/2006/main">
+  <p:cSld>
+    <p:spTree>
+      <p:nvGrpSpPr>
+        <p:cNvPr id="1" name=""/>
+        <p:cNvGrpSpPr/>
+        <p:nvPr/>
+      </p:nvGrpSpPr>
+      <p:grpSpPr>
+        <a:xfrm>
+          <a:off x="0" y="0"/>
+          <a:ext cx="0" cy="0"/>
+          <a:chOff x="0" y="0"/>
+          <a:chExt cx="0" cy="0"/>
+        </a:xfrm>
+      </p:grpSpPr>
+      <p:sp>
+        <p:nvSpPr>
+          <p:cNvPr id="9" name="pole tekstowe 8"/>
+          <p:cNvSpPr txBox="1"/>
+          <p:nvPr/>
+        </p:nvSpPr>
+        <p:spPr>
+          <a:xfrm>
+            <a:off x="489706" y="624631"/>
+            <a:ext cx="9291079" cy="4893647"/>
+          </a:xfrm>
+          <a:prstGeom prst="rect">
+            <a:avLst/>
+          </a:prstGeom>
+          <a:noFill/>
+        </p:spPr>
+        <p:txBody>
+          <a:bodyPr wrap="square" rtlCol="0">
+            <a:spAutoFit/>
+          </a:bodyPr>
+          <a:lstStyle/>
+          <a:p>
+            <a:r>
+              <a:rPr lang="pl-PL" sz="2800" b="1" dirty="0"/>
+              <a:t>XACT_ABORT</a:t>
+            </a:r>
+            <a:endParaRPr lang="en-US" sz="2800" b="1" dirty="0"/>
+          </a:p>
+          <a:p>
+            <a:endParaRPr lang="en-US" dirty="0"/>
+          </a:p>
+          <a:p>
+            <a:pPr lvl="1"/>
+            <a:r>
+              <a:rPr lang="en-US" sz="1600" dirty="0"/>
+              <a:t>XACT_ABORT works with all types of code and affects the entire batch. </a:t>
+            </a:r>
+            <a:r>
+              <a:rPr lang="en-US" sz="1600" b="1" dirty="0"/>
+              <a:t>You can make an entire batch fail if any error occurs by beginning it with SET XACT_ABORT ON</a:t>
+            </a:r>
+            <a:r>
+              <a:rPr lang="en-US" sz="1600" dirty="0"/>
+              <a:t>. You set XACT_ABORT per session.</a:t>
+            </a:r>
+            <a:endParaRPr lang="pl-PL" sz="1600" dirty="0"/>
+          </a:p>
+          <a:p>
+            <a:pPr lvl="1"/>
+            <a:endParaRPr lang="pl-PL" sz="1600" dirty="0"/>
+          </a:p>
+          <a:p>
+            <a:pPr lvl="1"/>
+            <a:r>
+              <a:rPr lang="en-US" sz="1600" dirty="0"/>
+              <a:t>After it is set to ON, all remaining transactions in that setting are subject to it until it is set to OFF.</a:t>
+            </a:r>
+            <a:endParaRPr lang="pl-PL" sz="1600" dirty="0"/>
+          </a:p>
+          <a:p>
+            <a:pPr lvl="1"/>
+            <a:endParaRPr lang="en-US" sz="1600" dirty="0"/>
+          </a:p>
+          <a:p>
+            <a:pPr lvl="1"/>
+            <a:r>
+              <a:rPr lang="en-US" sz="1600" dirty="0"/>
+              <a:t>SET XACT_ABORT has some advantages. It causes a transaction to roll back based on any error with severity &gt; 10.</a:t>
+            </a:r>
+            <a:endParaRPr lang="pl-PL" sz="1600" dirty="0"/>
+          </a:p>
+          <a:p>
+            <a:pPr lvl="1"/>
+            <a:endParaRPr lang="pl-PL" sz="1600" dirty="0"/>
+          </a:p>
+          <a:p>
+            <a:pPr lvl="1"/>
+            <a:r>
+              <a:rPr lang="en-US" sz="1600" dirty="0"/>
+              <a:t>However, XACT_ABORT has many limitations, such as the following:</a:t>
+            </a:r>
+            <a:endParaRPr lang="pl-PL" sz="1600" dirty="0"/>
+          </a:p>
+          <a:p>
+            <a:pPr lvl="1"/>
+            <a:endParaRPr lang="en-US" sz="1600" dirty="0"/>
+          </a:p>
+          <a:p>
+            <a:pPr marL="1200150" lvl="2" indent="-285750">
+              <a:buFont typeface="Arial" panose="020B0604020202020204" pitchFamily="34" charset="0"/>
+              <a:buChar char="•"/>
+            </a:pPr>
+            <a:r>
+              <a:rPr lang="en-US" sz="1600" i="1" dirty="0"/>
+              <a:t>You cannot trap for the error or capture the error number.</a:t>
+            </a:r>
+          </a:p>
+          <a:p>
+            <a:pPr marL="1200150" lvl="2" indent="-285750">
+              <a:buFont typeface="Arial" panose="020B0604020202020204" pitchFamily="34" charset="0"/>
+              <a:buChar char="•"/>
+            </a:pPr>
+            <a:r>
+              <a:rPr lang="en-US" sz="1600" i="1" dirty="0"/>
+              <a:t>Any error with severity level &gt; 10 causes the transaction to roll back.</a:t>
+            </a:r>
+          </a:p>
+          <a:p>
+            <a:pPr marL="1200150" lvl="2" indent="-285750">
+              <a:buFont typeface="Arial" panose="020B0604020202020204" pitchFamily="34" charset="0"/>
+              <a:buChar char="•"/>
+            </a:pPr>
+            <a:r>
+              <a:rPr lang="en-US" sz="1600" i="1" dirty="0"/>
+              <a:t>None of the remaining code in the transaction is executed. Even the final PRINT statements of the transaction are not executed.</a:t>
+            </a:r>
+          </a:p>
+          <a:p>
+            <a:pPr marL="1200150" lvl="2" indent="-285750">
+              <a:buFont typeface="Arial" panose="020B0604020202020204" pitchFamily="34" charset="0"/>
+              <a:buChar char="•"/>
+            </a:pPr>
+            <a:r>
+              <a:rPr lang="en-US" sz="1600" i="1" dirty="0"/>
+              <a:t>After the transaction is aborted, you can only infer what statements failed by inspecting the error message returned to the client by SQL Server.</a:t>
+            </a:r>
+            <a:endParaRPr lang="pl-PL" sz="1600" i="1" dirty="0"/>
+          </a:p>
+        </p:txBody>
+      </p:sp>
+      <p:sp>
+        <p:nvSpPr>
+          <p:cNvPr id="12" name="Symbol zastępczy stopki 11"/>
+          <p:cNvSpPr>
+            <a:spLocks noGrp="1"/>
+          </p:cNvSpPr>
+          <p:nvPr>
+            <p:ph type="ftr" sz="quarter" idx="11"/>
+          </p:nvPr>
+        </p:nvSpPr>
+        <p:spPr>
+          <a:xfrm>
+            <a:off x="3869268" y="6356350"/>
+            <a:ext cx="5911517" cy="365125"/>
+          </a:xfrm>
+        </p:spPr>
+        <p:txBody>
+          <a:bodyPr/>
+          <a:lstStyle/>
+          <a:p>
+            <a:r>
+              <a:rPr lang="en-US" smtClean="0"/>
+              <a:t>Developing SQL Databases</a:t>
+            </a:r>
+            <a:endParaRPr lang="pl-PL" dirty="0"/>
+          </a:p>
+        </p:txBody>
+      </p:sp>
+    </p:spTree>
+    <p:extLst>
+      <p:ext uri="{BB962C8B-B14F-4D97-AF65-F5344CB8AC3E}">
+        <p14:creationId xmlns:p14="http://schemas.microsoft.com/office/powerpoint/2010/main" val="2865137842"/>
+      </p:ext>
+    </p:extLst>
+  </p:cSld>
+  <p:clrMapOvr>
+    <a:masterClrMapping/>
+  </p:clrMapOvr>
+</p:sld>
+</file>
+
 <file path=ppt/slides/slide9.xml><?xml version="1.0" encoding="utf-8"?>
 <p:sld xmlns:a="http://schemas.openxmlformats.org/drawingml/2006/main" xmlns:r="http://schemas.openxmlformats.org/officeDocument/2006/relationships" xmlns:p="http://schemas.openxmlformats.org/presentationml/2006/main">
   <p:cSld>
@@ -5981,7 +6178,7 @@
         <p:spPr>
           <a:xfrm>
             <a:off x="489706" y="624631"/>
-            <a:ext cx="9291079" cy="5509200"/>
+            <a:ext cx="10374037" cy="523220"/>
           </a:xfrm>
           <a:prstGeom prst="rect">
             <a:avLst/>
@@ -6000,98 +6197,6 @@
             </a:r>
             <a:endParaRPr lang="en-US" sz="2800" b="1" dirty="0"/>
           </a:p>
-          <a:p>
-            <a:endParaRPr lang="en-US" dirty="0"/>
-          </a:p>
-          <a:p>
-            <a:r>
-              <a:rPr lang="en-US" dirty="0"/>
-              <a:t>XACT_ABORT works with all types of code and affects the entire batch. You can make an entire </a:t>
-            </a:r>
-            <a:r>
-              <a:rPr lang="en-US" b="1" dirty="0"/>
-              <a:t>batch</a:t>
-            </a:r>
-            <a:r>
-              <a:rPr lang="en-US" dirty="0"/>
-              <a:t> fail if any error occurs by beginning it with SET XACT_ABORT ON. You set XACT_ABORT per session.</a:t>
-            </a:r>
-            <a:endParaRPr lang="pl-PL" dirty="0"/>
-          </a:p>
-          <a:p>
-            <a:endParaRPr lang="pl-PL" dirty="0"/>
-          </a:p>
-          <a:p>
-            <a:r>
-              <a:rPr lang="en-US" dirty="0"/>
-              <a:t>After it is set to ON, all remaining transactions in that setting are subject to it until it is set to OFF.</a:t>
-            </a:r>
-            <a:endParaRPr lang="pl-PL" dirty="0"/>
-          </a:p>
-          <a:p>
-            <a:endParaRPr lang="en-US" dirty="0"/>
-          </a:p>
-          <a:p>
-            <a:r>
-              <a:rPr lang="en-US" dirty="0"/>
-              <a:t>SET XACT_ABORT has some advantages. It causes a transaction to roll back based on any error with severity &gt; 10.</a:t>
-            </a:r>
-            <a:endParaRPr lang="pl-PL" dirty="0"/>
-          </a:p>
-          <a:p>
-            <a:endParaRPr lang="pl-PL" dirty="0"/>
-          </a:p>
-          <a:p>
-            <a:r>
-              <a:rPr lang="en-US" dirty="0"/>
-              <a:t>However, XACT_ABORT has many limitations, such as the following:</a:t>
-            </a:r>
-            <a:endParaRPr lang="pl-PL" dirty="0"/>
-          </a:p>
-          <a:p>
-            <a:endParaRPr lang="en-US" dirty="0"/>
-          </a:p>
-          <a:p>
-            <a:pPr marL="285750" indent="-285750">
-              <a:buFont typeface="Arial" panose="020B0604020202020204" pitchFamily="34" charset="0"/>
-              <a:buChar char="•"/>
-            </a:pPr>
-            <a:r>
-              <a:rPr lang="en-US" dirty="0"/>
-              <a:t>You cannot trap for the error or capture the error number.</a:t>
-            </a:r>
-          </a:p>
-          <a:p>
-            <a:pPr marL="285750" indent="-285750">
-              <a:buFont typeface="Arial" panose="020B0604020202020204" pitchFamily="34" charset="0"/>
-              <a:buChar char="•"/>
-            </a:pPr>
-            <a:r>
-              <a:rPr lang="en-US" dirty="0"/>
-              <a:t>Any error with severity level &gt; 10 causes the transaction to roll back.</a:t>
-            </a:r>
-          </a:p>
-          <a:p>
-            <a:pPr marL="285750" indent="-285750">
-              <a:buFont typeface="Arial" panose="020B0604020202020204" pitchFamily="34" charset="0"/>
-              <a:buChar char="•"/>
-            </a:pPr>
-            <a:r>
-              <a:rPr lang="en-US" dirty="0"/>
-              <a:t>None of the remaining code in the transaction is executed. Even the final PRINT statements of the transaction are not executed.</a:t>
-            </a:r>
-          </a:p>
-          <a:p>
-            <a:pPr marL="285750" indent="-285750">
-              <a:buFont typeface="Arial" panose="020B0604020202020204" pitchFamily="34" charset="0"/>
-              <a:buChar char="•"/>
-            </a:pPr>
-            <a:r>
-              <a:rPr lang="en-US" dirty="0"/>
-              <a:t>After the transaction is aborted, you can only infer what statements failed by inspecting the error message returned to the client by SQL Server.</a:t>
-            </a:r>
-            <a:endParaRPr lang="pl-PL" dirty="0"/>
-          </a:p>
         </p:txBody>
       </p:sp>
       <p:sp>
@@ -6122,10 +6227,90 @@
           </a:p>
         </p:txBody>
       </p:sp>
+      <p:pic>
+        <p:nvPicPr>
+          <p:cNvPr id="2" name="Obraz 1">
+            <a:extLst>
+              <a:ext uri="{FF2B5EF4-FFF2-40B4-BE49-F238E27FC236}">
+                <a16:creationId xmlns="" xmlns:a16="http://schemas.microsoft.com/office/drawing/2014/main" id="{31DCFDEB-5A40-4D10-9CB0-E3C43AAF3645}"/>
+              </a:ext>
+            </a:extLst>
+          </p:cNvPr>
+          <p:cNvPicPr>
+            <a:picLocks noChangeAspect="1"/>
+          </p:cNvPicPr>
+          <p:nvPr/>
+        </p:nvPicPr>
+        <p:blipFill>
+          <a:blip r:embed="rId2"/>
+          <a:stretch>
+            <a:fillRect/>
+          </a:stretch>
+        </p:blipFill>
+        <p:spPr>
+          <a:xfrm>
+            <a:off x="1287728" y="1504200"/>
+            <a:ext cx="3895725" cy="4324350"/>
+          </a:xfrm>
+          <a:prstGeom prst="rect">
+            <a:avLst/>
+          </a:prstGeom>
+          <a:ln>
+            <a:noFill/>
+          </a:ln>
+          <a:effectLst>
+            <a:outerShdw blurRad="292100" dist="139700" dir="2700000" algn="tl" rotWithShape="0">
+              <a:srgbClr val="333333">
+                <a:alpha val="65000"/>
+              </a:srgbClr>
+            </a:outerShdw>
+          </a:effectLst>
+        </p:spPr>
+      </p:pic>
+      <p:pic>
+        <p:nvPicPr>
+          <p:cNvPr id="3" name="Obraz 2">
+            <a:extLst>
+              <a:ext uri="{FF2B5EF4-FFF2-40B4-BE49-F238E27FC236}">
+                <a16:creationId xmlns="" xmlns:a16="http://schemas.microsoft.com/office/drawing/2014/main" id="{1029454C-42D7-48AC-82F7-3AED4F8162CF}"/>
+              </a:ext>
+            </a:extLst>
+          </p:cNvPr>
+          <p:cNvPicPr>
+            <a:picLocks noChangeAspect="1"/>
+          </p:cNvPicPr>
+          <p:nvPr/>
+        </p:nvPicPr>
+        <p:blipFill>
+          <a:blip r:embed="rId3"/>
+          <a:stretch>
+            <a:fillRect/>
+          </a:stretch>
+        </p:blipFill>
+        <p:spPr>
+          <a:xfrm>
+            <a:off x="6557435" y="1504200"/>
+            <a:ext cx="4076700" cy="4495800"/>
+          </a:xfrm>
+          <a:prstGeom prst="rect">
+            <a:avLst/>
+          </a:prstGeom>
+          <a:ln>
+            <a:noFill/>
+          </a:ln>
+          <a:effectLst>
+            <a:outerShdw blurRad="292100" dist="139700" dir="2700000" algn="tl" rotWithShape="0">
+              <a:srgbClr val="333333">
+                <a:alpha val="65000"/>
+              </a:srgbClr>
+            </a:outerShdw>
+          </a:effectLst>
+        </p:spPr>
+      </p:pic>
     </p:spTree>
     <p:extLst>
       <p:ext uri="{BB962C8B-B14F-4D97-AF65-F5344CB8AC3E}">
-        <p14:creationId xmlns:p14="http://schemas.microsoft.com/office/powerpoint/2010/main" val="2865137842"/>
+        <p14:creationId xmlns:p14="http://schemas.microsoft.com/office/powerpoint/2010/main" val="2821951142"/>
       </p:ext>
     </p:extLst>
   </p:cSld>

</xml_diff>